<commit_message>
did spell check on the powerpoint
</commit_message>
<xml_diff>
--- a/Demo/Demo 2.pptx
+++ b/Demo/Demo 2.pptx
@@ -17,9 +17,8 @@
     <p:sldId id="274" r:id="rId11"/>
     <p:sldId id="272" r:id="rId12"/>
     <p:sldId id="275" r:id="rId13"/>
-    <p:sldId id="278" r:id="rId14"/>
-    <p:sldId id="263" r:id="rId15"/>
-    <p:sldId id="264" r:id="rId16"/>
+    <p:sldId id="263" r:id="rId14"/>
+    <p:sldId id="264" r:id="rId15"/>
   </p:sldIdLst>
   <p:sldSz cx="10080625" cy="7559675"/>
   <p:notesSz cx="7559675" cy="10691813"/>
@@ -412,7 +411,7 @@
             <a:fld id="{74CBEAF9-9E58-4CC8-A6FF-6DD8A58DEEA4}" type="datetimeFigureOut">
               <a:rPr lang="en-US" smtClean="0"/>
               <a:pPr/>
-              <a:t>7/29/2015</a:t>
+              <a:t>7/30/2015</a:t>
             </a:fld>
             <a:endParaRPr lang="en-US"/>
           </a:p>
@@ -2082,7 +2081,7 @@
             <a:fld id="{74CBEAF9-9E58-4CC8-A6FF-6DD8A58DEEA4}" type="datetimeFigureOut">
               <a:rPr lang="en-US" smtClean="0"/>
               <a:pPr/>
-              <a:t>7/29/2015</a:t>
+              <a:t>7/30/2015</a:t>
             </a:fld>
             <a:endParaRPr lang="en-US"/>
           </a:p>
@@ -3762,21 +3761,6 @@
               </a:rPr>
               <a:t> Charts</a:t>
             </a:r>
-            <a:endParaRPr lang="en-US" sz="6000" dirty="0" smtClean="0">
-              <a:solidFill>
-                <a:srgbClr val="4D4D4D"/>
-              </a:solidFill>
-              <a:effectLst>
-                <a:outerShdw blurRad="38100" dist="38100" dir="2700000" algn="tl">
-                  <a:srgbClr val="000000">
-                    <a:alpha val="43137"/>
-                  </a:srgbClr>
-                </a:outerShdw>
-              </a:effectLst>
-              <a:latin typeface="Arial Unicode MS" pitchFamily="34" charset="-128"/>
-              <a:ea typeface="Arial Unicode MS" pitchFamily="34" charset="-128"/>
-              <a:cs typeface="Arial Unicode MS" pitchFamily="34" charset="-128"/>
-            </a:endParaRPr>
           </a:p>
         </p:txBody>
       </p:sp>
@@ -3811,27 +3795,8 @@
                 <a:ea typeface="Arial Unicode MS" pitchFamily="34" charset="-128"/>
                 <a:cs typeface="Arial Unicode MS" pitchFamily="34" charset="-128"/>
               </a:rPr>
-              <a:t>Current phase </a:t>
-            </a:r>
-            <a:r>
-              <a:rPr lang="en-US" sz="3200" dirty="0" smtClean="0">
-                <a:solidFill>
-                  <a:srgbClr val="4D4D4D"/>
-                </a:solidFill>
-                <a:latin typeface="Arial Unicode MS" pitchFamily="34" charset="-128"/>
-                <a:ea typeface="Arial Unicode MS" pitchFamily="34" charset="-128"/>
-                <a:cs typeface="Arial Unicode MS" pitchFamily="34" charset="-128"/>
-              </a:rPr>
-              <a:t>: </a:t>
-            </a:r>
-            <a:endParaRPr lang="en-US" sz="3200" dirty="0" smtClean="0">
-              <a:solidFill>
-                <a:srgbClr val="4D4D4D"/>
-              </a:solidFill>
-              <a:latin typeface="Arial Unicode MS" pitchFamily="34" charset="-128"/>
-              <a:ea typeface="Arial Unicode MS" pitchFamily="34" charset="-128"/>
-              <a:cs typeface="Arial Unicode MS" pitchFamily="34" charset="-128"/>
-            </a:endParaRPr>
+              <a:t>Current phase : </a:t>
+            </a:r>
           </a:p>
         </p:txBody>
       </p:sp>
@@ -3954,21 +3919,6 @@
               </a:rPr>
               <a:t>Technologies </a:t>
             </a:r>
-            <a:endParaRPr lang="en-US" sz="6000" dirty="0" smtClean="0">
-              <a:solidFill>
-                <a:srgbClr val="4D4D4D"/>
-              </a:solidFill>
-              <a:effectLst>
-                <a:outerShdw blurRad="38100" dist="38100" dir="2700000" algn="tl">
-                  <a:srgbClr val="000000">
-                    <a:alpha val="43137"/>
-                  </a:srgbClr>
-                </a:outerShdw>
-              </a:effectLst>
-              <a:latin typeface="Arial Unicode MS" pitchFamily="34" charset="-128"/>
-              <a:ea typeface="Arial Unicode MS" pitchFamily="34" charset="-128"/>
-              <a:cs typeface="Arial Unicode MS" pitchFamily="34" charset="-128"/>
-            </a:endParaRPr>
           </a:p>
         </p:txBody>
       </p:sp>
@@ -4395,21 +4345,6 @@
               </a:rPr>
               <a:t>Unit Testing </a:t>
             </a:r>
-            <a:endParaRPr lang="en-US" sz="6000" dirty="0" smtClean="0">
-              <a:solidFill>
-                <a:srgbClr val="4D4D4D"/>
-              </a:solidFill>
-              <a:effectLst>
-                <a:outerShdw blurRad="38100" dist="38100" dir="2700000" algn="tl">
-                  <a:srgbClr val="000000">
-                    <a:alpha val="43137"/>
-                  </a:srgbClr>
-                </a:outerShdw>
-              </a:effectLst>
-              <a:latin typeface="Arial Unicode MS" pitchFamily="34" charset="-128"/>
-              <a:ea typeface="Arial Unicode MS" pitchFamily="34" charset="-128"/>
-              <a:cs typeface="Arial Unicode MS" pitchFamily="34" charset="-128"/>
-            </a:endParaRPr>
           </a:p>
         </p:txBody>
       </p:sp>
@@ -4444,10 +4379,8 @@
                 <a:ea typeface="Arial Unicode MS" pitchFamily="34" charset="-128"/>
                 <a:cs typeface="Arial Unicode MS" pitchFamily="34" charset="-128"/>
               </a:rPr>
-              <a:t>~ Phantom JS and Karma (Client side testing)</a:t>
-            </a:r>
-          </a:p>
-          <a:p>
+              <a:t>~ Phantom JS and Karma </a:t>
+            </a:r>
             <a:r>
               <a:rPr lang="en-US" sz="3200" dirty="0" smtClean="0">
                 <a:solidFill>
@@ -4457,7 +4390,75 @@
                 <a:ea typeface="Arial Unicode MS" pitchFamily="34" charset="-128"/>
                 <a:cs typeface="Arial Unicode MS" pitchFamily="34" charset="-128"/>
               </a:rPr>
-              <a:t>~ Mocha (Server side testing ) </a:t>
+              <a:t>(</a:t>
+            </a:r>
+            <a:r>
+              <a:rPr lang="en-US" sz="3200" dirty="0" smtClean="0">
+                <a:solidFill>
+                  <a:srgbClr val="4D4D4D"/>
+                </a:solidFill>
+                <a:latin typeface="Arial Unicode MS" pitchFamily="34" charset="-128"/>
+                <a:ea typeface="Arial Unicode MS" pitchFamily="34" charset="-128"/>
+                <a:cs typeface="Arial Unicode MS" pitchFamily="34" charset="-128"/>
+              </a:rPr>
+              <a:t>Server</a:t>
+            </a:r>
+            <a:r>
+              <a:rPr lang="en-US" sz="3200" dirty="0" smtClean="0">
+                <a:solidFill>
+                  <a:srgbClr val="4D4D4D"/>
+                </a:solidFill>
+                <a:latin typeface="Arial Unicode MS" pitchFamily="34" charset="-128"/>
+                <a:ea typeface="Arial Unicode MS" pitchFamily="34" charset="-128"/>
+                <a:cs typeface="Arial Unicode MS" pitchFamily="34" charset="-128"/>
+              </a:rPr>
+              <a:t> </a:t>
+            </a:r>
+            <a:r>
+              <a:rPr lang="en-US" sz="3200" dirty="0" smtClean="0">
+                <a:solidFill>
+                  <a:srgbClr val="4D4D4D"/>
+                </a:solidFill>
+                <a:latin typeface="Arial Unicode MS" pitchFamily="34" charset="-128"/>
+                <a:ea typeface="Arial Unicode MS" pitchFamily="34" charset="-128"/>
+                <a:cs typeface="Arial Unicode MS" pitchFamily="34" charset="-128"/>
+              </a:rPr>
+              <a:t>side testing)</a:t>
+            </a:r>
+          </a:p>
+          <a:p>
+            <a:r>
+              <a:rPr lang="en-US" sz="3200" dirty="0" smtClean="0">
+                <a:solidFill>
+                  <a:srgbClr val="4D4D4D"/>
+                </a:solidFill>
+                <a:latin typeface="Arial Unicode MS" pitchFamily="34" charset="-128"/>
+                <a:ea typeface="Arial Unicode MS" pitchFamily="34" charset="-128"/>
+                <a:cs typeface="Arial Unicode MS" pitchFamily="34" charset="-128"/>
+              </a:rPr>
+              <a:t>~ Mocha </a:t>
+            </a:r>
+            <a:r>
+              <a:rPr lang="en-US" sz="3200" smtClean="0">
+                <a:solidFill>
+                  <a:srgbClr val="4D4D4D"/>
+                </a:solidFill>
+                <a:latin typeface="Arial Unicode MS" pitchFamily="34" charset="-128"/>
+                <a:ea typeface="Arial Unicode MS" pitchFamily="34" charset="-128"/>
+                <a:cs typeface="Arial Unicode MS" pitchFamily="34" charset="-128"/>
+              </a:rPr>
+              <a:t>(Client side </a:t>
+            </a:r>
+            <a:r>
+              <a:rPr lang="en-US" sz="3200" dirty="0" smtClean="0">
+                <a:solidFill>
+                  <a:srgbClr val="4D4D4D"/>
+                </a:solidFill>
+                <a:latin typeface="Arial Unicode MS" pitchFamily="34" charset="-128"/>
+                <a:ea typeface="Arial Unicode MS" pitchFamily="34" charset="-128"/>
+                <a:cs typeface="Arial Unicode MS" pitchFamily="34" charset="-128"/>
+              </a:rPr>
+              <a:t>testing ) </a:t>
             </a:r>
             <a:endParaRPr lang="en-US" sz="2800" dirty="0" smtClean="0">
               <a:solidFill>
@@ -4551,117 +4552,6 @@
           <a:chExt cx="0" cy="0"/>
         </a:xfrm>
       </p:grpSpPr>
-      <p:sp>
-        <p:nvSpPr>
-          <p:cNvPr id="4" name="TextBox 3"/>
-          <p:cNvSpPr txBox="1"/>
-          <p:nvPr/>
-        </p:nvSpPr>
-        <p:spPr>
-          <a:xfrm>
-            <a:off x="1007864" y="3059757"/>
-            <a:ext cx="7945272" cy="1015663"/>
-          </a:xfrm>
-          <a:prstGeom prst="rect">
-            <a:avLst/>
-          </a:prstGeom>
-          <a:noFill/>
-        </p:spPr>
-        <p:txBody>
-          <a:bodyPr wrap="square" rtlCol="0">
-            <a:spAutoFit/>
-          </a:bodyPr>
-          <a:lstStyle/>
-          <a:p>
-            <a:pPr algn="ctr"/>
-            <a:r>
-              <a:rPr lang="en-US" sz="6000" smtClean="0">
-                <a:solidFill>
-                  <a:srgbClr val="4D4D4D"/>
-                </a:solidFill>
-                <a:effectLst>
-                  <a:outerShdw blurRad="38100" dist="38100" dir="2700000" algn="tl">
-                    <a:srgbClr val="000000">
-                      <a:alpha val="43137"/>
-                    </a:srgbClr>
-                  </a:outerShdw>
-                </a:effectLst>
-                <a:latin typeface="Arial Unicode MS" pitchFamily="34" charset="-128"/>
-                <a:ea typeface="Arial Unicode MS" pitchFamily="34" charset="-128"/>
-                <a:cs typeface="Arial Unicode MS" pitchFamily="34" charset="-128"/>
-              </a:rPr>
-              <a:t>THE END…</a:t>
-            </a:r>
-            <a:endParaRPr lang="en-US" sz="6000" dirty="0" smtClean="0">
-              <a:solidFill>
-                <a:srgbClr val="4D4D4D"/>
-              </a:solidFill>
-              <a:effectLst>
-                <a:outerShdw blurRad="38100" dist="38100" dir="2700000" algn="tl">
-                  <a:srgbClr val="000000">
-                    <a:alpha val="43137"/>
-                  </a:srgbClr>
-                </a:outerShdw>
-              </a:effectLst>
-              <a:latin typeface="Arial Unicode MS" pitchFamily="34" charset="-128"/>
-              <a:ea typeface="Arial Unicode MS" pitchFamily="34" charset="-128"/>
-              <a:cs typeface="Arial Unicode MS" pitchFamily="34" charset="-128"/>
-            </a:endParaRPr>
-          </a:p>
-        </p:txBody>
-      </p:sp>
-    </p:spTree>
-  </p:cSld>
-  <p:clrMapOvr>
-    <a:masterClrMapping/>
-  </p:clrMapOvr>
-  <p:timing>
-    <p:tnLst>
-      <p:par>
-        <p:cTn id="1" dur="indefinite" restart="never" nodeType="tmRoot">
-          <p:childTnLst>
-            <p:seq>
-              <p:cTn id="2" nodeType="mainSeq"/>
-              <p:prevCondLst>
-                <p:cond evt="onPrev" delay="0">
-                  <p:tgtEl>
-                    <p:sldTgt/>
-                  </p:tgtEl>
-                </p:cond>
-              </p:prevCondLst>
-              <p:nextCondLst>
-                <p:cond evt="onNext" delay="0">
-                  <p:tgtEl>
-                    <p:sldTgt/>
-                  </p:tgtEl>
-                </p:cond>
-              </p:nextCondLst>
-            </p:seq>
-          </p:childTnLst>
-        </p:cTn>
-      </p:par>
-    </p:tnLst>
-  </p:timing>
-</p:sld>
-</file>
-
-<file path=ppt/slides/slide14.xml><?xml version="1.0" encoding="utf-8"?>
-<p:sld xmlns:a="http://schemas.openxmlformats.org/drawingml/2006/main" xmlns:r="http://schemas.openxmlformats.org/officeDocument/2006/relationships" xmlns:p="http://schemas.openxmlformats.org/presentationml/2006/main">
-  <p:cSld>
-    <p:spTree>
-      <p:nvGrpSpPr>
-        <p:cNvPr id="1" name=""/>
-        <p:cNvGrpSpPr/>
-        <p:nvPr/>
-      </p:nvGrpSpPr>
-      <p:grpSpPr>
-        <a:xfrm>
-          <a:off x="0" y="0"/>
-          <a:ext cx="0" cy="0"/>
-          <a:chOff x="0" y="0"/>
-          <a:chExt cx="0" cy="0"/>
-        </a:xfrm>
-      </p:grpSpPr>
       <p:pic>
         <p:nvPicPr>
           <p:cNvPr id="57" name="Picture 56"/>
@@ -4709,12 +4599,65 @@
           <a:p>
             <a:pPr algn="ctr"/>
             <a:r>
-              <a:rPr lang="en-ZA" sz="4400">
-                <a:latin typeface="Arial"/>
-              </a:rPr>
-              <a:t>In this demo (continued):</a:t>
-            </a:r>
-            <a:endParaRPr/>
+              <a:rPr lang="en-ZA" sz="6000" dirty="0" smtClean="0">
+                <a:solidFill>
+                  <a:schemeClr val="bg1">
+                    <a:lumMod val="75000"/>
+                    <a:lumOff val="25000"/>
+                  </a:schemeClr>
+                </a:solidFill>
+                <a:effectLst>
+                  <a:outerShdw blurRad="38100" dist="38100" dir="2700000" algn="tl">
+                    <a:srgbClr val="000000">
+                      <a:alpha val="43137"/>
+                    </a:srgbClr>
+                  </a:outerShdw>
+                </a:effectLst>
+                <a:latin typeface="Arial Unicode MS" pitchFamily="34" charset="-128"/>
+                <a:ea typeface="Arial Unicode MS" pitchFamily="34" charset="-128"/>
+                <a:cs typeface="Arial Unicode MS" pitchFamily="34" charset="-128"/>
+              </a:rPr>
+              <a:t>High Level Use Case Diagram</a:t>
+            </a:r>
+            <a:r>
+              <a:rPr lang="en-ZA" sz="6000" dirty="0" smtClean="0">
+                <a:solidFill>
+                  <a:schemeClr val="bg1">
+                    <a:lumMod val="75000"/>
+                    <a:lumOff val="25000"/>
+                  </a:schemeClr>
+                </a:solidFill>
+                <a:effectLst>
+                  <a:outerShdw blurRad="38100" dist="38100" dir="2700000" algn="tl">
+                    <a:srgbClr val="000000">
+                      <a:alpha val="43137"/>
+                    </a:srgbClr>
+                  </a:outerShdw>
+                </a:effectLst>
+                <a:latin typeface="Arial Unicode MS" pitchFamily="34" charset="-128"/>
+                <a:ea typeface="Arial Unicode MS" pitchFamily="34" charset="-128"/>
+                <a:cs typeface="Arial Unicode MS" pitchFamily="34" charset="-128"/>
+              </a:rPr>
+              <a:t>:</a:t>
+            </a:r>
+            <a:endParaRPr sz="6000" dirty="0">
+              <a:solidFill>
+                <a:schemeClr val="bg1">
+                  <a:lumMod val="75000"/>
+                  <a:lumOff val="25000"/>
+                </a:schemeClr>
+              </a:solidFill>
+              <a:effectLst>
+                <a:outerShdw blurRad="38100" dist="38100" dir="2700000" algn="tl">
+                  <a:srgbClr val="000000">
+                    <a:alpha val="43137"/>
+                  </a:srgbClr>
+                </a:outerShdw>
+              </a:effectLst>
+              <a:latin typeface="Arial Unicode MS" pitchFamily="34" charset="-128"/>
+              <a:ea typeface="Arial Unicode MS" pitchFamily="34" charset="-128"/>
+              <a:cs typeface="Arial Unicode MS" pitchFamily="34" charset="-128"/>
+            </a:endParaRPr>
           </a:p>
         </p:txBody>
       </p:sp>
@@ -4739,100 +4682,310 @@
           <a:p>
             <a:pPr>
               <a:buSzPct val="45000"/>
-              <a:buFont typeface="StarSymbol"/>
-              <a:buChar char=""/>
             </a:pPr>
             <a:r>
-              <a:rPr lang="en-ZA" sz="3200">
-                <a:latin typeface="Arial"/>
-              </a:rPr>
-              <a:t>Demonstation of the system (Agile) for use cases:</a:t>
-            </a:r>
-            <a:endParaRPr/>
+              <a:rPr lang="en-ZA" sz="3200" dirty="0" smtClean="0">
+                <a:solidFill>
+                  <a:schemeClr val="bg1">
+                    <a:lumMod val="75000"/>
+                    <a:lumOff val="25000"/>
+                  </a:schemeClr>
+                </a:solidFill>
+                <a:latin typeface="Arial Unicode MS" pitchFamily="34" charset="-128"/>
+                <a:ea typeface="Arial Unicode MS" pitchFamily="34" charset="-128"/>
+                <a:cs typeface="Arial Unicode MS" pitchFamily="34" charset="-128"/>
+              </a:rPr>
+              <a:t>~ </a:t>
+            </a:r>
+            <a:r>
+              <a:rPr lang="en-ZA" sz="3200" dirty="0" err="1" smtClean="0">
+                <a:solidFill>
+                  <a:schemeClr val="bg1">
+                    <a:lumMod val="75000"/>
+                    <a:lumOff val="25000"/>
+                  </a:schemeClr>
+                </a:solidFill>
+                <a:latin typeface="Arial Unicode MS" pitchFamily="34" charset="-128"/>
+                <a:ea typeface="Arial Unicode MS" pitchFamily="34" charset="-128"/>
+                <a:cs typeface="Arial Unicode MS" pitchFamily="34" charset="-128"/>
+              </a:rPr>
+              <a:t>Demonstation</a:t>
+            </a:r>
+            <a:r>
+              <a:rPr lang="en-ZA" sz="3200" dirty="0" smtClean="0">
+                <a:solidFill>
+                  <a:schemeClr val="bg1">
+                    <a:lumMod val="75000"/>
+                    <a:lumOff val="25000"/>
+                  </a:schemeClr>
+                </a:solidFill>
+                <a:latin typeface="Arial Unicode MS" pitchFamily="34" charset="-128"/>
+                <a:ea typeface="Arial Unicode MS" pitchFamily="34" charset="-128"/>
+                <a:cs typeface="Arial Unicode MS" pitchFamily="34" charset="-128"/>
+              </a:rPr>
+              <a:t> </a:t>
+            </a:r>
+            <a:r>
+              <a:rPr lang="en-ZA" sz="3200" dirty="0">
+                <a:solidFill>
+                  <a:schemeClr val="bg1">
+                    <a:lumMod val="75000"/>
+                    <a:lumOff val="25000"/>
+                  </a:schemeClr>
+                </a:solidFill>
+                <a:latin typeface="Arial Unicode MS" pitchFamily="34" charset="-128"/>
+                <a:ea typeface="Arial Unicode MS" pitchFamily="34" charset="-128"/>
+                <a:cs typeface="Arial Unicode MS" pitchFamily="34" charset="-128"/>
+              </a:rPr>
+              <a:t>of the system (Agile) for use cases:</a:t>
+            </a:r>
+            <a:endParaRPr sz="3200" dirty="0">
+              <a:solidFill>
+                <a:schemeClr val="bg1">
+                  <a:lumMod val="75000"/>
+                  <a:lumOff val="25000"/>
+                </a:schemeClr>
+              </a:solidFill>
+              <a:latin typeface="Arial Unicode MS" pitchFamily="34" charset="-128"/>
+              <a:ea typeface="Arial Unicode MS" pitchFamily="34" charset="-128"/>
+              <a:cs typeface="Arial Unicode MS" pitchFamily="34" charset="-128"/>
+            </a:endParaRPr>
           </a:p>
           <a:p>
             <a:pPr lvl="1">
               <a:buSzPct val="75000"/>
-              <a:buFont typeface="StarSymbol"/>
-              <a:buChar char=""/>
             </a:pPr>
             <a:r>
-              <a:rPr lang="en-ZA" sz="2800">
-                <a:latin typeface="Arial"/>
-              </a:rPr>
-              <a:t>Profile</a:t>
-            </a:r>
-            <a:endParaRPr/>
+              <a:rPr lang="en-ZA" sz="3200" dirty="0" smtClean="0">
+                <a:solidFill>
+                  <a:schemeClr val="bg1">
+                    <a:lumMod val="75000"/>
+                    <a:lumOff val="25000"/>
+                  </a:schemeClr>
+                </a:solidFill>
+                <a:latin typeface="Arial Unicode MS" pitchFamily="34" charset="-128"/>
+                <a:ea typeface="Arial Unicode MS" pitchFamily="34" charset="-128"/>
+                <a:cs typeface="Arial Unicode MS" pitchFamily="34" charset="-128"/>
+              </a:rPr>
+              <a:t>- Profile</a:t>
+            </a:r>
+            <a:endParaRPr sz="3200" dirty="0">
+              <a:solidFill>
+                <a:schemeClr val="bg1">
+                  <a:lumMod val="75000"/>
+                  <a:lumOff val="25000"/>
+                </a:schemeClr>
+              </a:solidFill>
+              <a:latin typeface="Arial Unicode MS" pitchFamily="34" charset="-128"/>
+              <a:ea typeface="Arial Unicode MS" pitchFamily="34" charset="-128"/>
+              <a:cs typeface="Arial Unicode MS" pitchFamily="34" charset="-128"/>
+            </a:endParaRPr>
           </a:p>
           <a:p>
             <a:pPr lvl="1">
               <a:buSzPct val="75000"/>
-              <a:buFont typeface="StarSymbol"/>
-              <a:buChar char=""/>
             </a:pPr>
             <a:r>
-              <a:rPr lang="en-ZA" sz="2800">
-                <a:latin typeface="Arial"/>
+              <a:rPr lang="en-ZA" sz="3200" dirty="0" smtClean="0">
+                <a:solidFill>
+                  <a:schemeClr val="bg1">
+                    <a:lumMod val="75000"/>
+                    <a:lumOff val="25000"/>
+                  </a:schemeClr>
+                </a:solidFill>
+                <a:latin typeface="Arial Unicode MS" pitchFamily="34" charset="-128"/>
+                <a:ea typeface="Arial Unicode MS" pitchFamily="34" charset="-128"/>
+                <a:cs typeface="Arial Unicode MS" pitchFamily="34" charset="-128"/>
+              </a:rPr>
+              <a:t>- </a:t>
+            </a:r>
+            <a:r>
+              <a:rPr lang="en-ZA" sz="3200" dirty="0" err="1" smtClean="0">
+                <a:solidFill>
+                  <a:schemeClr val="bg1">
+                    <a:lumMod val="75000"/>
+                    <a:lumOff val="25000"/>
+                  </a:schemeClr>
+                </a:solidFill>
+                <a:latin typeface="Arial Unicode MS" pitchFamily="34" charset="-128"/>
+                <a:ea typeface="Arial Unicode MS" pitchFamily="34" charset="-128"/>
+                <a:cs typeface="Arial Unicode MS" pitchFamily="34" charset="-128"/>
               </a:rPr>
               <a:t>PlaceOrder</a:t>
             </a:r>
-            <a:endParaRPr/>
+            <a:endParaRPr sz="3200" dirty="0">
+              <a:solidFill>
+                <a:schemeClr val="bg1">
+                  <a:lumMod val="75000"/>
+                  <a:lumOff val="25000"/>
+                </a:schemeClr>
+              </a:solidFill>
+              <a:latin typeface="Arial Unicode MS" pitchFamily="34" charset="-128"/>
+              <a:ea typeface="Arial Unicode MS" pitchFamily="34" charset="-128"/>
+              <a:cs typeface="Arial Unicode MS" pitchFamily="34" charset="-128"/>
+            </a:endParaRPr>
           </a:p>
           <a:p>
             <a:pPr lvl="1">
               <a:buSzPct val="75000"/>
-              <a:buFont typeface="StarSymbol"/>
-              <a:buChar char=""/>
             </a:pPr>
             <a:r>
-              <a:rPr lang="en-ZA" sz="2800">
-                <a:latin typeface="Arial"/>
+              <a:rPr lang="en-ZA" sz="3200" dirty="0" smtClean="0">
+                <a:solidFill>
+                  <a:schemeClr val="bg1">
+                    <a:lumMod val="75000"/>
+                    <a:lumOff val="25000"/>
+                  </a:schemeClr>
+                </a:solidFill>
+                <a:latin typeface="Arial Unicode MS" pitchFamily="34" charset="-128"/>
+                <a:ea typeface="Arial Unicode MS" pitchFamily="34" charset="-128"/>
+                <a:cs typeface="Arial Unicode MS" pitchFamily="34" charset="-128"/>
+              </a:rPr>
+              <a:t>- </a:t>
+            </a:r>
+            <a:r>
+              <a:rPr lang="en-ZA" sz="3200" dirty="0" err="1" smtClean="0">
+                <a:solidFill>
+                  <a:schemeClr val="bg1">
+                    <a:lumMod val="75000"/>
+                    <a:lumOff val="25000"/>
+                  </a:schemeClr>
+                </a:solidFill>
+                <a:latin typeface="Arial Unicode MS" pitchFamily="34" charset="-128"/>
+                <a:ea typeface="Arial Unicode MS" pitchFamily="34" charset="-128"/>
+                <a:cs typeface="Arial Unicode MS" pitchFamily="34" charset="-128"/>
               </a:rPr>
               <a:t>ManageInventory</a:t>
             </a:r>
-            <a:endParaRPr/>
+            <a:endParaRPr sz="3200" dirty="0">
+              <a:solidFill>
+                <a:schemeClr val="bg1">
+                  <a:lumMod val="75000"/>
+                  <a:lumOff val="25000"/>
+                </a:schemeClr>
+              </a:solidFill>
+              <a:latin typeface="Arial Unicode MS" pitchFamily="34" charset="-128"/>
+              <a:ea typeface="Arial Unicode MS" pitchFamily="34" charset="-128"/>
+              <a:cs typeface="Arial Unicode MS" pitchFamily="34" charset="-128"/>
+            </a:endParaRPr>
           </a:p>
           <a:p>
             <a:pPr lvl="1">
               <a:buSzPct val="75000"/>
-              <a:buFont typeface="StarSymbol"/>
-              <a:buChar char=""/>
             </a:pPr>
             <a:r>
-              <a:rPr lang="en-ZA" sz="2800">
-                <a:latin typeface="Arial"/>
+              <a:rPr lang="en-ZA" sz="3200" dirty="0" smtClean="0">
+                <a:solidFill>
+                  <a:schemeClr val="bg1">
+                    <a:lumMod val="75000"/>
+                    <a:lumOff val="25000"/>
+                  </a:schemeClr>
+                </a:solidFill>
+                <a:latin typeface="Arial Unicode MS" pitchFamily="34" charset="-128"/>
+                <a:ea typeface="Arial Unicode MS" pitchFamily="34" charset="-128"/>
+                <a:cs typeface="Arial Unicode MS" pitchFamily="34" charset="-128"/>
+              </a:rPr>
+              <a:t>- </a:t>
+            </a:r>
+            <a:r>
+              <a:rPr lang="en-ZA" sz="3200" dirty="0" err="1" smtClean="0">
+                <a:solidFill>
+                  <a:schemeClr val="bg1">
+                    <a:lumMod val="75000"/>
+                    <a:lumOff val="25000"/>
+                  </a:schemeClr>
+                </a:solidFill>
+                <a:latin typeface="Arial Unicode MS" pitchFamily="34" charset="-128"/>
+                <a:ea typeface="Arial Unicode MS" pitchFamily="34" charset="-128"/>
+                <a:cs typeface="Arial Unicode MS" pitchFamily="34" charset="-128"/>
               </a:rPr>
               <a:t>ManageMenu</a:t>
             </a:r>
-            <a:endParaRPr/>
+            <a:endParaRPr sz="3200" dirty="0">
+              <a:solidFill>
+                <a:schemeClr val="bg1">
+                  <a:lumMod val="75000"/>
+                  <a:lumOff val="25000"/>
+                </a:schemeClr>
+              </a:solidFill>
+              <a:latin typeface="Arial Unicode MS" pitchFamily="34" charset="-128"/>
+              <a:ea typeface="Arial Unicode MS" pitchFamily="34" charset="-128"/>
+              <a:cs typeface="Arial Unicode MS" pitchFamily="34" charset="-128"/>
+            </a:endParaRPr>
           </a:p>
           <a:p>
             <a:pPr lvl="1">
               <a:buSzPct val="75000"/>
-              <a:buFont typeface="StarSymbol"/>
-              <a:buChar char=""/>
             </a:pPr>
             <a:r>
-              <a:rPr lang="en-ZA" sz="2800">
-                <a:latin typeface="Arial"/>
-              </a:rPr>
-              <a:t>Authentication</a:t>
-            </a:r>
-            <a:endParaRPr/>
+              <a:rPr lang="en-ZA" sz="3200" dirty="0" smtClean="0">
+                <a:solidFill>
+                  <a:schemeClr val="bg1">
+                    <a:lumMod val="75000"/>
+                    <a:lumOff val="25000"/>
+                  </a:schemeClr>
+                </a:solidFill>
+                <a:latin typeface="Arial Unicode MS" pitchFamily="34" charset="-128"/>
+                <a:ea typeface="Arial Unicode MS" pitchFamily="34" charset="-128"/>
+                <a:cs typeface="Arial Unicode MS" pitchFamily="34" charset="-128"/>
+              </a:rPr>
+              <a:t>- Authentication</a:t>
+            </a:r>
+            <a:endParaRPr sz="3200" dirty="0">
+              <a:solidFill>
+                <a:schemeClr val="bg1">
+                  <a:lumMod val="75000"/>
+                  <a:lumOff val="25000"/>
+                </a:schemeClr>
+              </a:solidFill>
+              <a:latin typeface="Arial Unicode MS" pitchFamily="34" charset="-128"/>
+              <a:ea typeface="Arial Unicode MS" pitchFamily="34" charset="-128"/>
+              <a:cs typeface="Arial Unicode MS" pitchFamily="34" charset="-128"/>
+            </a:endParaRPr>
           </a:p>
           <a:p>
             <a:pPr lvl="1">
               <a:buSzPct val="75000"/>
-              <a:buFont typeface="StarSymbol"/>
-              <a:buChar char=""/>
             </a:pPr>
             <a:r>
-              <a:rPr lang="en-ZA" sz="2800">
-                <a:latin typeface="Arial"/>
-              </a:rPr>
-              <a:t>Manage System  </a:t>
-            </a:r>
-            <a:endParaRPr/>
+              <a:rPr lang="en-ZA" sz="3200" dirty="0" smtClean="0">
+                <a:solidFill>
+                  <a:schemeClr val="bg1">
+                    <a:lumMod val="75000"/>
+                    <a:lumOff val="25000"/>
+                  </a:schemeClr>
+                </a:solidFill>
+                <a:latin typeface="Arial Unicode MS" pitchFamily="34" charset="-128"/>
+                <a:ea typeface="Arial Unicode MS" pitchFamily="34" charset="-128"/>
+                <a:cs typeface="Arial Unicode MS" pitchFamily="34" charset="-128"/>
+              </a:rPr>
+              <a:t>- Manage </a:t>
+            </a:r>
+            <a:r>
+              <a:rPr lang="en-ZA" sz="3200" dirty="0">
+                <a:solidFill>
+                  <a:schemeClr val="bg1">
+                    <a:lumMod val="75000"/>
+                    <a:lumOff val="25000"/>
+                  </a:schemeClr>
+                </a:solidFill>
+                <a:latin typeface="Arial Unicode MS" pitchFamily="34" charset="-128"/>
+                <a:ea typeface="Arial Unicode MS" pitchFamily="34" charset="-128"/>
+                <a:cs typeface="Arial Unicode MS" pitchFamily="34" charset="-128"/>
+              </a:rPr>
+              <a:t>System  </a:t>
+            </a:r>
+            <a:endParaRPr sz="3200" dirty="0">
+              <a:solidFill>
+                <a:schemeClr val="bg1">
+                  <a:lumMod val="75000"/>
+                  <a:lumOff val="25000"/>
+                </a:schemeClr>
+              </a:solidFill>
+              <a:latin typeface="Arial Unicode MS" pitchFamily="34" charset="-128"/>
+              <a:ea typeface="Arial Unicode MS" pitchFamily="34" charset="-128"/>
+              <a:cs typeface="Arial Unicode MS" pitchFamily="34" charset="-128"/>
+            </a:endParaRPr>
           </a:p>
         </p:txBody>
       </p:sp>
@@ -4841,10 +4994,17 @@
   <p:clrMapOvr>
     <a:masterClrMapping/>
   </p:clrMapOvr>
+  <p:timing>
+    <p:tnLst>
+      <p:par>
+        <p:cTn id="1" dur="indefinite" restart="never" nodeType="tmRoot"/>
+      </p:par>
+    </p:tnLst>
+  </p:timing>
 </p:sld>
 </file>
 
-<file path=ppt/slides/slide15.xml><?xml version="1.0" encoding="utf-8"?>
+<file path=ppt/slides/slide14.xml><?xml version="1.0" encoding="utf-8"?>
 <p:sld xmlns:a="http://schemas.openxmlformats.org/drawingml/2006/main" xmlns:r="http://schemas.openxmlformats.org/officeDocument/2006/relationships" xmlns:p="http://schemas.openxmlformats.org/presentationml/2006/main">
   <p:cSld>
     <p:spTree>
@@ -4882,12 +5042,30 @@
           <a:p>
             <a:pPr algn="ctr"/>
             <a:r>
-              <a:rPr lang="en-ZA" sz="4400">
-                <a:latin typeface="Arial"/>
-              </a:rPr>
-              <a:t>In this demo (continued):</a:t>
-            </a:r>
-            <a:endParaRPr/>
+              <a:rPr lang="en-ZA" sz="6000" dirty="0" smtClean="0">
+                <a:solidFill>
+                  <a:schemeClr val="bg1">
+                    <a:lumMod val="75000"/>
+                    <a:lumOff val="25000"/>
+                  </a:schemeClr>
+                </a:solidFill>
+                <a:latin typeface="Arial Unicode MS" pitchFamily="34" charset="-128"/>
+                <a:ea typeface="Arial Unicode MS" pitchFamily="34" charset="-128"/>
+                <a:cs typeface="Arial Unicode MS" pitchFamily="34" charset="-128"/>
+              </a:rPr>
+              <a:t>Documentation:</a:t>
+            </a:r>
+            <a:endParaRPr sz="6000" dirty="0">
+              <a:solidFill>
+                <a:schemeClr val="bg1">
+                  <a:lumMod val="75000"/>
+                  <a:lumOff val="25000"/>
+                </a:schemeClr>
+              </a:solidFill>
+              <a:latin typeface="Arial Unicode MS" pitchFamily="34" charset="-128"/>
+              <a:ea typeface="Arial Unicode MS" pitchFamily="34" charset="-128"/>
+              <a:cs typeface="Arial Unicode MS" pitchFamily="34" charset="-128"/>
+            </a:endParaRPr>
           </a:p>
         </p:txBody>
       </p:sp>
@@ -4911,87 +5089,209 @@
           <a:lstStyle/>
           <a:p>
             <a:pPr>
-              <a:buSzPct val="45000"/>
-              <a:buFont typeface="StarSymbol"/>
-              <a:buChar char=""/>
+              <a:buSzPct val="75000"/>
             </a:pPr>
             <a:r>
-              <a:rPr lang="en-ZA" sz="3200">
-                <a:latin typeface="Arial"/>
-              </a:rPr>
-              <a:t>Documentation: </a:t>
-            </a:r>
-            <a:endParaRPr/>
-          </a:p>
-          <a:p>
-            <a:pPr lvl="1">
+              <a:rPr lang="en-ZA" sz="3200" dirty="0" smtClean="0">
+                <a:solidFill>
+                  <a:schemeClr val="bg1">
+                    <a:lumMod val="75000"/>
+                    <a:lumOff val="25000"/>
+                  </a:schemeClr>
+                </a:solidFill>
+                <a:latin typeface="Arial Unicode MS" pitchFamily="34" charset="-128"/>
+                <a:ea typeface="Arial Unicode MS" pitchFamily="34" charset="-128"/>
+                <a:cs typeface="Arial Unicode MS" pitchFamily="34" charset="-128"/>
+              </a:rPr>
+              <a:t>~ Functional Specification</a:t>
+            </a:r>
+            <a:endParaRPr sz="3200" dirty="0">
+              <a:solidFill>
+                <a:schemeClr val="bg1">
+                  <a:lumMod val="75000"/>
+                  <a:lumOff val="25000"/>
+                </a:schemeClr>
+              </a:solidFill>
+              <a:latin typeface="Arial Unicode MS" pitchFamily="34" charset="-128"/>
+              <a:ea typeface="Arial Unicode MS" pitchFamily="34" charset="-128"/>
+              <a:cs typeface="Arial Unicode MS" pitchFamily="34" charset="-128"/>
+            </a:endParaRPr>
+          </a:p>
+          <a:p>
+            <a:pPr>
               <a:buSzPct val="75000"/>
-              <a:buFont typeface="StarSymbol"/>
-              <a:buChar char=""/>
             </a:pPr>
             <a:r>
-              <a:rPr lang="en-ZA" sz="2800">
-                <a:latin typeface="Arial"/>
-              </a:rPr>
-              <a:t>Functional Specification</a:t>
-            </a:r>
-            <a:endParaRPr/>
-          </a:p>
-          <a:p>
-            <a:pPr lvl="1">
+              <a:rPr lang="en-ZA" sz="3200" dirty="0" smtClean="0">
+                <a:solidFill>
+                  <a:schemeClr val="bg1">
+                    <a:lumMod val="75000"/>
+                    <a:lumOff val="25000"/>
+                  </a:schemeClr>
+                </a:solidFill>
+                <a:latin typeface="Arial Unicode MS" pitchFamily="34" charset="-128"/>
+                <a:ea typeface="Arial Unicode MS" pitchFamily="34" charset="-128"/>
+                <a:cs typeface="Arial Unicode MS" pitchFamily="34" charset="-128"/>
+              </a:rPr>
+              <a:t>~ Architecture </a:t>
+            </a:r>
+            <a:r>
+              <a:rPr lang="en-ZA" sz="3200" dirty="0">
+                <a:solidFill>
+                  <a:schemeClr val="bg1">
+                    <a:lumMod val="75000"/>
+                    <a:lumOff val="25000"/>
+                  </a:schemeClr>
+                </a:solidFill>
+                <a:latin typeface="Arial Unicode MS" pitchFamily="34" charset="-128"/>
+                <a:ea typeface="Arial Unicode MS" pitchFamily="34" charset="-128"/>
+                <a:cs typeface="Arial Unicode MS" pitchFamily="34" charset="-128"/>
+              </a:rPr>
+              <a:t>Specification</a:t>
+            </a:r>
+            <a:endParaRPr sz="3200" dirty="0">
+              <a:solidFill>
+                <a:schemeClr val="bg1">
+                  <a:lumMod val="75000"/>
+                  <a:lumOff val="25000"/>
+                </a:schemeClr>
+              </a:solidFill>
+              <a:latin typeface="Arial Unicode MS" pitchFamily="34" charset="-128"/>
+              <a:ea typeface="Arial Unicode MS" pitchFamily="34" charset="-128"/>
+              <a:cs typeface="Arial Unicode MS" pitchFamily="34" charset="-128"/>
+            </a:endParaRPr>
+          </a:p>
+          <a:p>
+            <a:pPr>
               <a:buSzPct val="75000"/>
-              <a:buFont typeface="StarSymbol"/>
-              <a:buChar char=""/>
             </a:pPr>
             <a:r>
-              <a:rPr lang="en-ZA" sz="2800">
-                <a:latin typeface="Arial"/>
-              </a:rPr>
-              <a:t>Architecture Specification</a:t>
-            </a:r>
-            <a:endParaRPr/>
-          </a:p>
-          <a:p>
-            <a:pPr lvl="1">
+              <a:rPr lang="en-ZA" sz="3200" dirty="0" smtClean="0">
+                <a:solidFill>
+                  <a:schemeClr val="bg1">
+                    <a:lumMod val="75000"/>
+                    <a:lumOff val="25000"/>
+                  </a:schemeClr>
+                </a:solidFill>
+                <a:latin typeface="Arial Unicode MS" pitchFamily="34" charset="-128"/>
+                <a:ea typeface="Arial Unicode MS" pitchFamily="34" charset="-128"/>
+                <a:cs typeface="Arial Unicode MS" pitchFamily="34" charset="-128"/>
+              </a:rPr>
+              <a:t>~ Testing </a:t>
+            </a:r>
+            <a:r>
+              <a:rPr lang="en-ZA" sz="3200" dirty="0">
+                <a:solidFill>
+                  <a:schemeClr val="bg1">
+                    <a:lumMod val="75000"/>
+                    <a:lumOff val="25000"/>
+                  </a:schemeClr>
+                </a:solidFill>
+                <a:latin typeface="Arial Unicode MS" pitchFamily="34" charset="-128"/>
+                <a:ea typeface="Arial Unicode MS" pitchFamily="34" charset="-128"/>
+                <a:cs typeface="Arial Unicode MS" pitchFamily="34" charset="-128"/>
+              </a:rPr>
+              <a:t>documentation</a:t>
+            </a:r>
+            <a:endParaRPr sz="3200" dirty="0">
+              <a:solidFill>
+                <a:schemeClr val="bg1">
+                  <a:lumMod val="75000"/>
+                  <a:lumOff val="25000"/>
+                </a:schemeClr>
+              </a:solidFill>
+              <a:latin typeface="Arial Unicode MS" pitchFamily="34" charset="-128"/>
+              <a:ea typeface="Arial Unicode MS" pitchFamily="34" charset="-128"/>
+              <a:cs typeface="Arial Unicode MS" pitchFamily="34" charset="-128"/>
+            </a:endParaRPr>
+          </a:p>
+          <a:p>
+            <a:pPr>
               <a:buSzPct val="75000"/>
-              <a:buFont typeface="StarSymbol"/>
-              <a:buChar char=""/>
             </a:pPr>
             <a:r>
-              <a:rPr lang="en-ZA" sz="2800">
-                <a:latin typeface="Arial"/>
-              </a:rPr>
-              <a:t>Testing documentation</a:t>
-            </a:r>
-            <a:endParaRPr/>
-          </a:p>
-          <a:p>
-            <a:pPr lvl="1">
+              <a:rPr lang="en-ZA" sz="3200" dirty="0" smtClean="0">
+                <a:solidFill>
+                  <a:schemeClr val="bg1">
+                    <a:lumMod val="75000"/>
+                    <a:lumOff val="25000"/>
+                  </a:schemeClr>
+                </a:solidFill>
+                <a:latin typeface="Arial Unicode MS" pitchFamily="34" charset="-128"/>
+                <a:ea typeface="Arial Unicode MS" pitchFamily="34" charset="-128"/>
+                <a:cs typeface="Arial Unicode MS" pitchFamily="34" charset="-128"/>
+              </a:rPr>
+              <a:t>~ User </a:t>
+            </a:r>
+            <a:r>
+              <a:rPr lang="en-ZA" sz="3200" dirty="0">
+                <a:solidFill>
+                  <a:schemeClr val="bg1">
+                    <a:lumMod val="75000"/>
+                    <a:lumOff val="25000"/>
+                  </a:schemeClr>
+                </a:solidFill>
+                <a:latin typeface="Arial Unicode MS" pitchFamily="34" charset="-128"/>
+                <a:ea typeface="Arial Unicode MS" pitchFamily="34" charset="-128"/>
+                <a:cs typeface="Arial Unicode MS" pitchFamily="34" charset="-128"/>
+              </a:rPr>
+              <a:t>Manual</a:t>
+            </a:r>
+            <a:endParaRPr sz="3200" dirty="0">
+              <a:solidFill>
+                <a:schemeClr val="bg1">
+                  <a:lumMod val="75000"/>
+                  <a:lumOff val="25000"/>
+                </a:schemeClr>
+              </a:solidFill>
+              <a:latin typeface="Arial Unicode MS" pitchFamily="34" charset="-128"/>
+              <a:ea typeface="Arial Unicode MS" pitchFamily="34" charset="-128"/>
+              <a:cs typeface="Arial Unicode MS" pitchFamily="34" charset="-128"/>
+            </a:endParaRPr>
+          </a:p>
+          <a:p>
+            <a:pPr>
               <a:buSzPct val="75000"/>
-              <a:buFont typeface="StarSymbol"/>
-              <a:buChar char=""/>
             </a:pPr>
             <a:r>
-              <a:rPr lang="en-ZA" sz="2800">
-                <a:latin typeface="Arial"/>
-              </a:rPr>
-              <a:t>User Manual</a:t>
-            </a:r>
-            <a:endParaRPr/>
-          </a:p>
-          <a:p>
-            <a:pPr lvl="1">
-              <a:buSzPct val="75000"/>
-              <a:buFont typeface="StarSymbol"/>
-              <a:buChar char=""/>
-            </a:pPr>
-            <a:r>
-              <a:rPr lang="en-ZA" sz="2800">
-                <a:latin typeface="Arial"/>
-              </a:rPr>
-              <a:t>Design Documentation</a:t>
-            </a:r>
-            <a:endParaRPr/>
+              <a:rPr lang="en-ZA" sz="3200" dirty="0" smtClean="0">
+                <a:solidFill>
+                  <a:schemeClr val="bg1">
+                    <a:lumMod val="75000"/>
+                    <a:lumOff val="25000"/>
+                  </a:schemeClr>
+                </a:solidFill>
+                <a:latin typeface="Arial Unicode MS" pitchFamily="34" charset="-128"/>
+                <a:ea typeface="Arial Unicode MS" pitchFamily="34" charset="-128"/>
+                <a:cs typeface="Arial Unicode MS" pitchFamily="34" charset="-128"/>
+              </a:rPr>
+              <a:t>~ Design </a:t>
+            </a:r>
+            <a:r>
+              <a:rPr lang="en-ZA" sz="3200" dirty="0">
+                <a:solidFill>
+                  <a:schemeClr val="bg1">
+                    <a:lumMod val="75000"/>
+                    <a:lumOff val="25000"/>
+                  </a:schemeClr>
+                </a:solidFill>
+                <a:latin typeface="Arial Unicode MS" pitchFamily="34" charset="-128"/>
+                <a:ea typeface="Arial Unicode MS" pitchFamily="34" charset="-128"/>
+                <a:cs typeface="Arial Unicode MS" pitchFamily="34" charset="-128"/>
+              </a:rPr>
+              <a:t>Documentation</a:t>
+            </a:r>
+            <a:endParaRPr sz="3200" dirty="0">
+              <a:solidFill>
+                <a:schemeClr val="bg1">
+                  <a:lumMod val="75000"/>
+                  <a:lumOff val="25000"/>
+                </a:schemeClr>
+              </a:solidFill>
+              <a:latin typeface="Arial Unicode MS" pitchFamily="34" charset="-128"/>
+              <a:ea typeface="Arial Unicode MS" pitchFamily="34" charset="-128"/>
+              <a:cs typeface="Arial Unicode MS" pitchFamily="34" charset="-128"/>
+            </a:endParaRPr>
           </a:p>
         </p:txBody>
       </p:sp>
@@ -5000,6 +5300,13 @@
   <p:clrMapOvr>
     <a:masterClrMapping/>
   </p:clrMapOvr>
+  <p:timing>
+    <p:tnLst>
+      <p:par>
+        <p:cTn id="1" dur="indefinite" restart="never" nodeType="tmRoot"/>
+      </p:par>
+    </p:tnLst>
+  </p:timing>
 </p:sld>
 </file>
 
@@ -5061,21 +5368,6 @@
               </a:rPr>
               <a:t>In this presentation</a:t>
             </a:r>
-            <a:endParaRPr lang="en-US" sz="6000" dirty="0" smtClean="0">
-              <a:solidFill>
-                <a:srgbClr val="4D4D4D"/>
-              </a:solidFill>
-              <a:effectLst>
-                <a:outerShdw blurRad="38100" dist="38100" dir="2700000" algn="tl">
-                  <a:srgbClr val="000000">
-                    <a:alpha val="43137"/>
-                  </a:srgbClr>
-                </a:outerShdw>
-              </a:effectLst>
-              <a:latin typeface="Arial Unicode MS" pitchFamily="34" charset="-128"/>
-              <a:ea typeface="Arial Unicode MS" pitchFamily="34" charset="-128"/>
-              <a:cs typeface="Arial Unicode MS" pitchFamily="34" charset="-128"/>
-            </a:endParaRPr>
           </a:p>
         </p:txBody>
       </p:sp>
@@ -5270,21 +5562,6 @@
               </a:rPr>
               <a:t>Software Development Methodology </a:t>
             </a:r>
-            <a:endParaRPr lang="en-US" sz="6000" dirty="0" smtClean="0">
-              <a:solidFill>
-                <a:srgbClr val="4D4D4D"/>
-              </a:solidFill>
-              <a:effectLst>
-                <a:outerShdw blurRad="38100" dist="38100" dir="2700000" algn="tl">
-                  <a:srgbClr val="000000">
-                    <a:alpha val="43137"/>
-                  </a:srgbClr>
-                </a:outerShdw>
-              </a:effectLst>
-              <a:latin typeface="Arial Unicode MS" pitchFamily="34" charset="-128"/>
-              <a:ea typeface="Arial Unicode MS" pitchFamily="34" charset="-128"/>
-              <a:cs typeface="Arial Unicode MS" pitchFamily="34" charset="-128"/>
-            </a:endParaRPr>
           </a:p>
         </p:txBody>
       </p:sp>
@@ -5380,14 +5657,6 @@
               </a:rPr>
               <a:t>2) Identify top priorities (for sprints)</a:t>
             </a:r>
-            <a:endParaRPr lang="en-US" sz="3600" dirty="0" smtClean="0">
-              <a:solidFill>
-                <a:srgbClr val="4D4D4D"/>
-              </a:solidFill>
-              <a:latin typeface="Arial Unicode MS" pitchFamily="34" charset="-128"/>
-              <a:ea typeface="Arial Unicode MS" pitchFamily="34" charset="-128"/>
-              <a:cs typeface="Arial Unicode MS" pitchFamily="34" charset="-128"/>
-            </a:endParaRPr>
           </a:p>
           <a:p>
             <a:r>
@@ -5575,21 +5844,6 @@
               </a:rPr>
               <a:t>Software Development Methodology </a:t>
             </a:r>
-            <a:endParaRPr lang="en-US" sz="6000" dirty="0" smtClean="0">
-              <a:solidFill>
-                <a:srgbClr val="4D4D4D"/>
-              </a:solidFill>
-              <a:effectLst>
-                <a:outerShdw blurRad="38100" dist="38100" dir="2700000" algn="tl">
-                  <a:srgbClr val="000000">
-                    <a:alpha val="43137"/>
-                  </a:srgbClr>
-                </a:outerShdw>
-              </a:effectLst>
-              <a:latin typeface="Arial Unicode MS" pitchFamily="34" charset="-128"/>
-              <a:ea typeface="Arial Unicode MS" pitchFamily="34" charset="-128"/>
-              <a:cs typeface="Arial Unicode MS" pitchFamily="34" charset="-128"/>
-            </a:endParaRPr>
           </a:p>
         </p:txBody>
       </p:sp>
@@ -5826,21 +6080,6 @@
               </a:rPr>
               <a:t>Software Development Methodology </a:t>
             </a:r>
-            <a:endParaRPr lang="en-US" sz="6000" dirty="0" smtClean="0">
-              <a:solidFill>
-                <a:srgbClr val="4D4D4D"/>
-              </a:solidFill>
-              <a:effectLst>
-                <a:outerShdw blurRad="38100" dist="38100" dir="2700000" algn="tl">
-                  <a:srgbClr val="000000">
-                    <a:alpha val="43137"/>
-                  </a:srgbClr>
-                </a:outerShdw>
-              </a:effectLst>
-              <a:latin typeface="Arial Unicode MS" pitchFamily="34" charset="-128"/>
-              <a:ea typeface="Arial Unicode MS" pitchFamily="34" charset="-128"/>
-              <a:cs typeface="Arial Unicode MS" pitchFamily="34" charset="-128"/>
-            </a:endParaRPr>
           </a:p>
         </p:txBody>
       </p:sp>
@@ -6203,21 +6442,6 @@
               </a:rPr>
               <a:t>Client Meetings</a:t>
             </a:r>
-            <a:endParaRPr lang="en-US" sz="6000" dirty="0" smtClean="0">
-              <a:solidFill>
-                <a:srgbClr val="4D4D4D"/>
-              </a:solidFill>
-              <a:effectLst>
-                <a:outerShdw blurRad="38100" dist="38100" dir="2700000" algn="tl">
-                  <a:srgbClr val="000000">
-                    <a:alpha val="43137"/>
-                  </a:srgbClr>
-                </a:outerShdw>
-              </a:effectLst>
-              <a:latin typeface="Arial Unicode MS" pitchFamily="34" charset="-128"/>
-              <a:ea typeface="Arial Unicode MS" pitchFamily="34" charset="-128"/>
-              <a:cs typeface="Arial Unicode MS" pitchFamily="34" charset="-128"/>
-            </a:endParaRPr>
           </a:p>
         </p:txBody>
       </p:sp>
@@ -6267,14 +6491,6 @@
               </a:rPr>
               <a:t>~ Discuss alterations</a:t>
             </a:r>
-            <a:endParaRPr lang="en-US" sz="3600" dirty="0" smtClean="0">
-              <a:solidFill>
-                <a:srgbClr val="4D4D4D"/>
-              </a:solidFill>
-              <a:latin typeface="Arial Unicode MS" pitchFamily="34" charset="-128"/>
-              <a:ea typeface="Arial Unicode MS" pitchFamily="34" charset="-128"/>
-              <a:cs typeface="Arial Unicode MS" pitchFamily="34" charset="-128"/>
-            </a:endParaRPr>
           </a:p>
           <a:p>
             <a:r>
@@ -6451,21 +6667,6 @@
               </a:rPr>
               <a:t>Project Management Tools </a:t>
             </a:r>
-            <a:endParaRPr lang="en-US" sz="6000" dirty="0" smtClean="0">
-              <a:solidFill>
-                <a:srgbClr val="4D4D4D"/>
-              </a:solidFill>
-              <a:effectLst>
-                <a:outerShdw blurRad="38100" dist="38100" dir="2700000" algn="tl">
-                  <a:srgbClr val="000000">
-                    <a:alpha val="43137"/>
-                  </a:srgbClr>
-                </a:outerShdw>
-              </a:effectLst>
-              <a:latin typeface="Arial Unicode MS" pitchFamily="34" charset="-128"/>
-              <a:ea typeface="Arial Unicode MS" pitchFamily="34" charset="-128"/>
-              <a:cs typeface="Arial Unicode MS" pitchFamily="34" charset="-128"/>
-            </a:endParaRPr>
           </a:p>
         </p:txBody>
       </p:sp>
@@ -6500,7 +6701,29 @@
                 <a:ea typeface="Arial Unicode MS" pitchFamily="34" charset="-128"/>
                 <a:cs typeface="Arial Unicode MS" pitchFamily="34" charset="-128"/>
               </a:rPr>
-              <a:t>~ Waffle.io – Scrum Board, liked with all </a:t>
+              <a:t>~ Waffle.io – Scrum Board, </a:t>
+            </a:r>
+            <a:r>
+              <a:rPr lang="en-US" sz="3600" dirty="0" smtClean="0">
+                <a:solidFill>
+                  <a:srgbClr val="4D4D4D"/>
+                </a:solidFill>
+                <a:latin typeface="Arial Unicode MS" pitchFamily="34" charset="-128"/>
+                <a:ea typeface="Arial Unicode MS" pitchFamily="34" charset="-128"/>
+                <a:cs typeface="Arial Unicode MS" pitchFamily="34" charset="-128"/>
+              </a:rPr>
+              <a:t>linked </a:t>
+            </a:r>
+            <a:r>
+              <a:rPr lang="en-US" sz="3600" dirty="0" smtClean="0">
+                <a:solidFill>
+                  <a:srgbClr val="4D4D4D"/>
+                </a:solidFill>
+                <a:latin typeface="Arial Unicode MS" pitchFamily="34" charset="-128"/>
+                <a:ea typeface="Arial Unicode MS" pitchFamily="34" charset="-128"/>
+                <a:cs typeface="Arial Unicode MS" pitchFamily="34" charset="-128"/>
+              </a:rPr>
+              <a:t>with all </a:t>
             </a:r>
             <a:r>
               <a:rPr lang="en-US" sz="3600" dirty="0" err="1" smtClean="0">
@@ -6546,18 +6769,7 @@
                 <a:ea typeface="Arial Unicode MS" pitchFamily="34" charset="-128"/>
                 <a:cs typeface="Arial Unicode MS" pitchFamily="34" charset="-128"/>
               </a:rPr>
-              <a:t>		</a:t>
-            </a:r>
-            <a:r>
-              <a:rPr lang="en-US" sz="3600" dirty="0" smtClean="0">
-                <a:solidFill>
-                  <a:srgbClr val="4D4D4D"/>
-                </a:solidFill>
-                <a:latin typeface="Arial Unicode MS" pitchFamily="34" charset="-128"/>
-                <a:ea typeface="Arial Unicode MS" pitchFamily="34" charset="-128"/>
-                <a:cs typeface="Arial Unicode MS" pitchFamily="34" charset="-128"/>
-              </a:rPr>
-              <a:t>issues and milestones</a:t>
+              <a:t>		issues and milestones</a:t>
             </a:r>
             <a:r>
               <a:rPr lang="en-US" sz="2800" dirty="0">
@@ -6801,21 +7013,6 @@
               </a:rPr>
               <a:t>Scrum Board</a:t>
             </a:r>
-            <a:endParaRPr lang="en-US" sz="6000" dirty="0" smtClean="0">
-              <a:solidFill>
-                <a:srgbClr val="4D4D4D"/>
-              </a:solidFill>
-              <a:effectLst>
-                <a:outerShdw blurRad="38100" dist="38100" dir="2700000" algn="tl">
-                  <a:srgbClr val="000000">
-                    <a:alpha val="43137"/>
-                  </a:srgbClr>
-                </a:outerShdw>
-              </a:effectLst>
-              <a:latin typeface="Arial Unicode MS" pitchFamily="34" charset="-128"/>
-              <a:ea typeface="Arial Unicode MS" pitchFamily="34" charset="-128"/>
-              <a:cs typeface="Arial Unicode MS" pitchFamily="34" charset="-128"/>
-            </a:endParaRPr>
           </a:p>
         </p:txBody>
       </p:sp>
@@ -6900,14 +7097,6 @@
               </a:rPr>
               <a:t> repo</a:t>
             </a:r>
-            <a:endParaRPr lang="en-US" sz="2800" dirty="0" smtClean="0">
-              <a:solidFill>
-                <a:srgbClr val="4D4D4D"/>
-              </a:solidFill>
-              <a:latin typeface="Arial Unicode MS" pitchFamily="34" charset="-128"/>
-              <a:ea typeface="Arial Unicode MS" pitchFamily="34" charset="-128"/>
-              <a:cs typeface="Arial Unicode MS" pitchFamily="34" charset="-128"/>
-            </a:endParaRPr>
           </a:p>
         </p:txBody>
       </p:sp>
@@ -7022,21 +7211,6 @@
               </a:rPr>
               <a:t> Charts</a:t>
             </a:r>
-            <a:endParaRPr lang="en-US" sz="6000" dirty="0" smtClean="0">
-              <a:solidFill>
-                <a:srgbClr val="4D4D4D"/>
-              </a:solidFill>
-              <a:effectLst>
-                <a:outerShdw blurRad="38100" dist="38100" dir="2700000" algn="tl">
-                  <a:srgbClr val="000000">
-                    <a:alpha val="43137"/>
-                  </a:srgbClr>
-                </a:outerShdw>
-              </a:effectLst>
-              <a:latin typeface="Arial Unicode MS" pitchFamily="34" charset="-128"/>
-              <a:ea typeface="Arial Unicode MS" pitchFamily="34" charset="-128"/>
-              <a:cs typeface="Arial Unicode MS" pitchFamily="34" charset="-128"/>
-            </a:endParaRPr>
           </a:p>
         </p:txBody>
       </p:sp>
@@ -7099,14 +7273,6 @@
               </a:rPr>
               <a:t>Phase 1 – completed: </a:t>
             </a:r>
-            <a:endParaRPr lang="en-US" sz="3200" dirty="0" smtClean="0">
-              <a:solidFill>
-                <a:srgbClr val="4D4D4D"/>
-              </a:solidFill>
-              <a:latin typeface="Arial Unicode MS" pitchFamily="34" charset="-128"/>
-              <a:ea typeface="Arial Unicode MS" pitchFamily="34" charset="-128"/>
-              <a:cs typeface="Arial Unicode MS" pitchFamily="34" charset="-128"/>
-            </a:endParaRPr>
           </a:p>
         </p:txBody>
       </p:sp>
@@ -7169,14 +7335,6 @@
               </a:rPr>
               <a:t>Phase 2 – completed: </a:t>
             </a:r>
-            <a:endParaRPr lang="en-US" sz="3200" dirty="0" smtClean="0">
-              <a:solidFill>
-                <a:srgbClr val="4D4D4D"/>
-              </a:solidFill>
-              <a:latin typeface="Arial Unicode MS" pitchFamily="34" charset="-128"/>
-              <a:ea typeface="Arial Unicode MS" pitchFamily="34" charset="-128"/>
-              <a:cs typeface="Arial Unicode MS" pitchFamily="34" charset="-128"/>
-            </a:endParaRPr>
           </a:p>
         </p:txBody>
       </p:sp>
@@ -7235,14 +7393,6 @@
               </a:rPr>
               <a:t> repo</a:t>
             </a:r>
-            <a:endParaRPr lang="en-US" sz="2800" dirty="0" smtClean="0">
-              <a:solidFill>
-                <a:srgbClr val="4D4D4D"/>
-              </a:solidFill>
-              <a:latin typeface="Arial Unicode MS" pitchFamily="34" charset="-128"/>
-              <a:ea typeface="Arial Unicode MS" pitchFamily="34" charset="-128"/>
-              <a:cs typeface="Arial Unicode MS" pitchFamily="34" charset="-128"/>
-            </a:endParaRPr>
           </a:p>
         </p:txBody>
       </p:sp>

</xml_diff>

<commit_message>
adding new demo slides
</commit_message>
<xml_diff>
--- a/Demo/Demo 2.pptx
+++ b/Demo/Demo 2.pptx
@@ -17,8 +17,7 @@
     <p:sldId id="274" r:id="rId11"/>
     <p:sldId id="272" r:id="rId12"/>
     <p:sldId id="275" r:id="rId13"/>
-    <p:sldId id="263" r:id="rId14"/>
-    <p:sldId id="264" r:id="rId15"/>
+    <p:sldId id="278" r:id="rId14"/>
   </p:sldIdLst>
   <p:sldSz cx="10080625" cy="7559675"/>
   <p:notesSz cx="7559675" cy="10691813"/>
@@ -411,7 +410,7 @@
             <a:fld id="{74CBEAF9-9E58-4CC8-A6FF-6DD8A58DEEA4}" type="datetimeFigureOut">
               <a:rPr lang="en-US" smtClean="0"/>
               <a:pPr/>
-              <a:t>7/30/2015</a:t>
+              <a:t>7/31/2015</a:t>
             </a:fld>
             <a:endParaRPr lang="en-US"/>
           </a:p>
@@ -2081,7 +2080,7 @@
             <a:fld id="{74CBEAF9-9E58-4CC8-A6FF-6DD8A58DEEA4}" type="datetimeFigureOut">
               <a:rPr lang="en-US" smtClean="0"/>
               <a:pPr/>
-              <a:t>7/30/2015</a:t>
+              <a:t>7/31/2015</a:t>
             </a:fld>
             <a:endParaRPr lang="en-US"/>
           </a:p>
@@ -4379,51 +4378,7 @@
                 <a:ea typeface="Arial Unicode MS" pitchFamily="34" charset="-128"/>
                 <a:cs typeface="Arial Unicode MS" pitchFamily="34" charset="-128"/>
               </a:rPr>
-              <a:t>~ Phantom JS and Karma </a:t>
-            </a:r>
-            <a:r>
-              <a:rPr lang="en-US" sz="3200" dirty="0" smtClean="0">
-                <a:solidFill>
-                  <a:srgbClr val="4D4D4D"/>
-                </a:solidFill>
-                <a:latin typeface="Arial Unicode MS" pitchFamily="34" charset="-128"/>
-                <a:ea typeface="Arial Unicode MS" pitchFamily="34" charset="-128"/>
-                <a:cs typeface="Arial Unicode MS" pitchFamily="34" charset="-128"/>
-              </a:rPr>
-              <a:t>(</a:t>
-            </a:r>
-            <a:r>
-              <a:rPr lang="en-US" sz="3200" dirty="0" smtClean="0">
-                <a:solidFill>
-                  <a:srgbClr val="4D4D4D"/>
-                </a:solidFill>
-                <a:latin typeface="Arial Unicode MS" pitchFamily="34" charset="-128"/>
-                <a:ea typeface="Arial Unicode MS" pitchFamily="34" charset="-128"/>
-                <a:cs typeface="Arial Unicode MS" pitchFamily="34" charset="-128"/>
-              </a:rPr>
-              <a:t>Server</a:t>
-            </a:r>
-            <a:r>
-              <a:rPr lang="en-US" sz="3200" dirty="0" smtClean="0">
-                <a:solidFill>
-                  <a:srgbClr val="4D4D4D"/>
-                </a:solidFill>
-                <a:latin typeface="Arial Unicode MS" pitchFamily="34" charset="-128"/>
-                <a:ea typeface="Arial Unicode MS" pitchFamily="34" charset="-128"/>
-                <a:cs typeface="Arial Unicode MS" pitchFamily="34" charset="-128"/>
-              </a:rPr>
-              <a:t> </a:t>
-            </a:r>
-            <a:r>
-              <a:rPr lang="en-US" sz="3200" dirty="0" smtClean="0">
-                <a:solidFill>
-                  <a:srgbClr val="4D4D4D"/>
-                </a:solidFill>
-                <a:latin typeface="Arial Unicode MS" pitchFamily="34" charset="-128"/>
-                <a:ea typeface="Arial Unicode MS" pitchFamily="34" charset="-128"/>
-                <a:cs typeface="Arial Unicode MS" pitchFamily="34" charset="-128"/>
-              </a:rPr>
-              <a:t>side testing)</a:t>
+              <a:t>~ Phantom JS and Karma (Server side testing)</a:t>
             </a:r>
           </a:p>
           <a:p>
@@ -4552,59 +4507,33 @@
           <a:chExt cx="0" cy="0"/>
         </a:xfrm>
       </p:grpSpPr>
-      <p:pic>
-        <p:nvPicPr>
-          <p:cNvPr id="57" name="Picture 56"/>
-          <p:cNvPicPr/>
+      <p:sp>
+        <p:nvSpPr>
+          <p:cNvPr id="4" name="TextBox 3"/>
+          <p:cNvSpPr txBox="1"/>
           <p:nvPr/>
-        </p:nvPicPr>
-        <p:blipFill>
-          <a:blip r:embed="rId2" cstate="print"/>
-          <a:srcRect l="2683" t="15997" r="18739" b="45669"/>
-          <a:stretch>
-            <a:fillRect/>
-          </a:stretch>
-        </p:blipFill>
+        </p:nvSpPr>
         <p:spPr>
           <a:xfrm>
-            <a:off x="3888000" y="2952000"/>
-            <a:ext cx="6120000" cy="3024000"/>
+            <a:off x="935856" y="1403573"/>
+            <a:ext cx="7945272" cy="1446550"/>
           </a:xfrm>
           <a:prstGeom prst="rect">
             <a:avLst/>
           </a:prstGeom>
-          <a:ln>
-            <a:noFill/>
-          </a:ln>
+          <a:noFill/>
         </p:spPr>
-      </p:pic>
-      <p:sp>
-        <p:nvSpPr>
-          <p:cNvPr id="58" name="TextShape 1"/>
-          <p:cNvSpPr txBox="1"/>
-          <p:nvPr/>
-        </p:nvSpPr>
-        <p:spPr>
-          <a:xfrm>
-            <a:off x="504000" y="301320"/>
-            <a:ext cx="9071640" cy="1262160"/>
-          </a:xfrm>
-          <a:prstGeom prst="rect">
-            <a:avLst/>
-          </a:prstGeom>
-        </p:spPr>
-        <p:txBody>
-          <a:bodyPr lIns="0" tIns="0" rIns="0" bIns="0" anchor="ctr"/>
+        <p:txBody>
+          <a:bodyPr wrap="square" rtlCol="0">
+            <a:spAutoFit/>
+          </a:bodyPr>
           <a:lstStyle/>
           <a:p>
             <a:pPr algn="ctr"/>
             <a:r>
-              <a:rPr lang="en-ZA" sz="6000" dirty="0" smtClean="0">
-                <a:solidFill>
-                  <a:schemeClr val="bg1">
-                    <a:lumMod val="75000"/>
-                    <a:lumOff val="25000"/>
-                  </a:schemeClr>
+              <a:rPr lang="en-US" sz="8800" dirty="0" smtClean="0">
+                <a:solidFill>
+                  <a:srgbClr val="4D4D4D"/>
                 </a:solidFill>
                 <a:effectLst>
                   <a:outerShdw blurRad="38100" dist="38100" dir="2700000" algn="tl">
@@ -4617,378 +4546,37 @@
                 <a:ea typeface="Arial Unicode MS" pitchFamily="34" charset="-128"/>
                 <a:cs typeface="Arial Unicode MS" pitchFamily="34" charset="-128"/>
               </a:rPr>
-              <a:t>High Level Use Case Diagram</a:t>
-            </a:r>
-            <a:r>
-              <a:rPr lang="en-ZA" sz="6000" dirty="0" smtClean="0">
-                <a:solidFill>
-                  <a:schemeClr val="bg1">
-                    <a:lumMod val="75000"/>
-                    <a:lumOff val="25000"/>
-                  </a:schemeClr>
-                </a:solidFill>
-                <a:effectLst>
-                  <a:outerShdw blurRad="38100" dist="38100" dir="2700000" algn="tl">
-                    <a:srgbClr val="000000">
-                      <a:alpha val="43137"/>
-                    </a:srgbClr>
-                  </a:outerShdw>
-                </a:effectLst>
-                <a:latin typeface="Arial Unicode MS" pitchFamily="34" charset="-128"/>
-                <a:ea typeface="Arial Unicode MS" pitchFamily="34" charset="-128"/>
-                <a:cs typeface="Arial Unicode MS" pitchFamily="34" charset="-128"/>
-              </a:rPr>
-              <a:t>:</a:t>
-            </a:r>
-            <a:endParaRPr sz="6000" dirty="0">
-              <a:solidFill>
-                <a:schemeClr val="bg1">
-                  <a:lumMod val="75000"/>
-                  <a:lumOff val="25000"/>
-                </a:schemeClr>
-              </a:solidFill>
-              <a:effectLst>
-                <a:outerShdw blurRad="38100" dist="38100" dir="2700000" algn="tl">
-                  <a:srgbClr val="000000">
-                    <a:alpha val="43137"/>
-                  </a:srgbClr>
-                </a:outerShdw>
-              </a:effectLst>
-              <a:latin typeface="Arial Unicode MS" pitchFamily="34" charset="-128"/>
-              <a:ea typeface="Arial Unicode MS" pitchFamily="34" charset="-128"/>
-              <a:cs typeface="Arial Unicode MS" pitchFamily="34" charset="-128"/>
-            </a:endParaRPr>
-          </a:p>
-        </p:txBody>
-      </p:sp>
-      <p:sp>
-        <p:nvSpPr>
-          <p:cNvPr id="59" name="TextShape 2"/>
-          <p:cNvSpPr txBox="1"/>
+              <a:t>Demo CMS</a:t>
+            </a:r>
+          </a:p>
+        </p:txBody>
+      </p:sp>
+      <p:pic>
+        <p:nvPicPr>
+          <p:cNvPr id="1026" name="Picture 2" descr="https://kendallwilson3.files.wordpress.com/2014/11/slider-baby-excited-940x420.jpg"/>
+          <p:cNvPicPr>
+            <a:picLocks noChangeAspect="1" noChangeArrowheads="1"/>
+          </p:cNvPicPr>
           <p:nvPr/>
-        </p:nvSpPr>
-        <p:spPr>
+        </p:nvPicPr>
+        <p:blipFill>
+          <a:blip r:embed="rId2" cstate="print"/>
+          <a:srcRect/>
+          <a:stretch>
+            <a:fillRect/>
+          </a:stretch>
+        </p:blipFill>
+        <p:spPr bwMode="auto">
           <a:xfrm>
-            <a:off x="504000" y="1769040"/>
-            <a:ext cx="9071640" cy="4384440"/>
+            <a:off x="1151880" y="2987749"/>
+            <a:ext cx="7867650" cy="3514726"/>
           </a:xfrm>
           <a:prstGeom prst="rect">
             <a:avLst/>
           </a:prstGeom>
+          <a:noFill/>
         </p:spPr>
-        <p:txBody>
-          <a:bodyPr lIns="0" tIns="0" rIns="0" bIns="0"/>
-          <a:lstStyle/>
-          <a:p>
-            <a:pPr>
-              <a:buSzPct val="45000"/>
-            </a:pPr>
-            <a:r>
-              <a:rPr lang="en-ZA" sz="3200" dirty="0" smtClean="0">
-                <a:solidFill>
-                  <a:schemeClr val="bg1">
-                    <a:lumMod val="75000"/>
-                    <a:lumOff val="25000"/>
-                  </a:schemeClr>
-                </a:solidFill>
-                <a:latin typeface="Arial Unicode MS" pitchFamily="34" charset="-128"/>
-                <a:ea typeface="Arial Unicode MS" pitchFamily="34" charset="-128"/>
-                <a:cs typeface="Arial Unicode MS" pitchFamily="34" charset="-128"/>
-              </a:rPr>
-              <a:t>~ </a:t>
-            </a:r>
-            <a:r>
-              <a:rPr lang="en-ZA" sz="3200" dirty="0" err="1" smtClean="0">
-                <a:solidFill>
-                  <a:schemeClr val="bg1">
-                    <a:lumMod val="75000"/>
-                    <a:lumOff val="25000"/>
-                  </a:schemeClr>
-                </a:solidFill>
-                <a:latin typeface="Arial Unicode MS" pitchFamily="34" charset="-128"/>
-                <a:ea typeface="Arial Unicode MS" pitchFamily="34" charset="-128"/>
-                <a:cs typeface="Arial Unicode MS" pitchFamily="34" charset="-128"/>
-              </a:rPr>
-              <a:t>Demonstation</a:t>
-            </a:r>
-            <a:r>
-              <a:rPr lang="en-ZA" sz="3200" dirty="0" smtClean="0">
-                <a:solidFill>
-                  <a:schemeClr val="bg1">
-                    <a:lumMod val="75000"/>
-                    <a:lumOff val="25000"/>
-                  </a:schemeClr>
-                </a:solidFill>
-                <a:latin typeface="Arial Unicode MS" pitchFamily="34" charset="-128"/>
-                <a:ea typeface="Arial Unicode MS" pitchFamily="34" charset="-128"/>
-                <a:cs typeface="Arial Unicode MS" pitchFamily="34" charset="-128"/>
-              </a:rPr>
-              <a:t> </a:t>
-            </a:r>
-            <a:r>
-              <a:rPr lang="en-ZA" sz="3200" dirty="0">
-                <a:solidFill>
-                  <a:schemeClr val="bg1">
-                    <a:lumMod val="75000"/>
-                    <a:lumOff val="25000"/>
-                  </a:schemeClr>
-                </a:solidFill>
-                <a:latin typeface="Arial Unicode MS" pitchFamily="34" charset="-128"/>
-                <a:ea typeface="Arial Unicode MS" pitchFamily="34" charset="-128"/>
-                <a:cs typeface="Arial Unicode MS" pitchFamily="34" charset="-128"/>
-              </a:rPr>
-              <a:t>of the system (Agile) for use cases:</a:t>
-            </a:r>
-            <a:endParaRPr sz="3200" dirty="0">
-              <a:solidFill>
-                <a:schemeClr val="bg1">
-                  <a:lumMod val="75000"/>
-                  <a:lumOff val="25000"/>
-                </a:schemeClr>
-              </a:solidFill>
-              <a:latin typeface="Arial Unicode MS" pitchFamily="34" charset="-128"/>
-              <a:ea typeface="Arial Unicode MS" pitchFamily="34" charset="-128"/>
-              <a:cs typeface="Arial Unicode MS" pitchFamily="34" charset="-128"/>
-            </a:endParaRPr>
-          </a:p>
-          <a:p>
-            <a:pPr lvl="1">
-              <a:buSzPct val="75000"/>
-            </a:pPr>
-            <a:r>
-              <a:rPr lang="en-ZA" sz="3200" dirty="0" smtClean="0">
-                <a:solidFill>
-                  <a:schemeClr val="bg1">
-                    <a:lumMod val="75000"/>
-                    <a:lumOff val="25000"/>
-                  </a:schemeClr>
-                </a:solidFill>
-                <a:latin typeface="Arial Unicode MS" pitchFamily="34" charset="-128"/>
-                <a:ea typeface="Arial Unicode MS" pitchFamily="34" charset="-128"/>
-                <a:cs typeface="Arial Unicode MS" pitchFamily="34" charset="-128"/>
-              </a:rPr>
-              <a:t>- Profile</a:t>
-            </a:r>
-            <a:endParaRPr sz="3200" dirty="0">
-              <a:solidFill>
-                <a:schemeClr val="bg1">
-                  <a:lumMod val="75000"/>
-                  <a:lumOff val="25000"/>
-                </a:schemeClr>
-              </a:solidFill>
-              <a:latin typeface="Arial Unicode MS" pitchFamily="34" charset="-128"/>
-              <a:ea typeface="Arial Unicode MS" pitchFamily="34" charset="-128"/>
-              <a:cs typeface="Arial Unicode MS" pitchFamily="34" charset="-128"/>
-            </a:endParaRPr>
-          </a:p>
-          <a:p>
-            <a:pPr lvl="1">
-              <a:buSzPct val="75000"/>
-            </a:pPr>
-            <a:r>
-              <a:rPr lang="en-ZA" sz="3200" dirty="0" smtClean="0">
-                <a:solidFill>
-                  <a:schemeClr val="bg1">
-                    <a:lumMod val="75000"/>
-                    <a:lumOff val="25000"/>
-                  </a:schemeClr>
-                </a:solidFill>
-                <a:latin typeface="Arial Unicode MS" pitchFamily="34" charset="-128"/>
-                <a:ea typeface="Arial Unicode MS" pitchFamily="34" charset="-128"/>
-                <a:cs typeface="Arial Unicode MS" pitchFamily="34" charset="-128"/>
-              </a:rPr>
-              <a:t>- </a:t>
-            </a:r>
-            <a:r>
-              <a:rPr lang="en-ZA" sz="3200" dirty="0" err="1" smtClean="0">
-                <a:solidFill>
-                  <a:schemeClr val="bg1">
-                    <a:lumMod val="75000"/>
-                    <a:lumOff val="25000"/>
-                  </a:schemeClr>
-                </a:solidFill>
-                <a:latin typeface="Arial Unicode MS" pitchFamily="34" charset="-128"/>
-                <a:ea typeface="Arial Unicode MS" pitchFamily="34" charset="-128"/>
-                <a:cs typeface="Arial Unicode MS" pitchFamily="34" charset="-128"/>
-              </a:rPr>
-              <a:t>PlaceOrder</a:t>
-            </a:r>
-            <a:endParaRPr sz="3200" dirty="0">
-              <a:solidFill>
-                <a:schemeClr val="bg1">
-                  <a:lumMod val="75000"/>
-                  <a:lumOff val="25000"/>
-                </a:schemeClr>
-              </a:solidFill>
-              <a:latin typeface="Arial Unicode MS" pitchFamily="34" charset="-128"/>
-              <a:ea typeface="Arial Unicode MS" pitchFamily="34" charset="-128"/>
-              <a:cs typeface="Arial Unicode MS" pitchFamily="34" charset="-128"/>
-            </a:endParaRPr>
-          </a:p>
-          <a:p>
-            <a:pPr lvl="1">
-              <a:buSzPct val="75000"/>
-            </a:pPr>
-            <a:r>
-              <a:rPr lang="en-ZA" sz="3200" dirty="0" smtClean="0">
-                <a:solidFill>
-                  <a:schemeClr val="bg1">
-                    <a:lumMod val="75000"/>
-                    <a:lumOff val="25000"/>
-                  </a:schemeClr>
-                </a:solidFill>
-                <a:latin typeface="Arial Unicode MS" pitchFamily="34" charset="-128"/>
-                <a:ea typeface="Arial Unicode MS" pitchFamily="34" charset="-128"/>
-                <a:cs typeface="Arial Unicode MS" pitchFamily="34" charset="-128"/>
-              </a:rPr>
-              <a:t>- </a:t>
-            </a:r>
-            <a:r>
-              <a:rPr lang="en-ZA" sz="3200" dirty="0" err="1" smtClean="0">
-                <a:solidFill>
-                  <a:schemeClr val="bg1">
-                    <a:lumMod val="75000"/>
-                    <a:lumOff val="25000"/>
-                  </a:schemeClr>
-                </a:solidFill>
-                <a:latin typeface="Arial Unicode MS" pitchFamily="34" charset="-128"/>
-                <a:ea typeface="Arial Unicode MS" pitchFamily="34" charset="-128"/>
-                <a:cs typeface="Arial Unicode MS" pitchFamily="34" charset="-128"/>
-              </a:rPr>
-              <a:t>ManageInventory</a:t>
-            </a:r>
-            <a:endParaRPr sz="3200" dirty="0">
-              <a:solidFill>
-                <a:schemeClr val="bg1">
-                  <a:lumMod val="75000"/>
-                  <a:lumOff val="25000"/>
-                </a:schemeClr>
-              </a:solidFill>
-              <a:latin typeface="Arial Unicode MS" pitchFamily="34" charset="-128"/>
-              <a:ea typeface="Arial Unicode MS" pitchFamily="34" charset="-128"/>
-              <a:cs typeface="Arial Unicode MS" pitchFamily="34" charset="-128"/>
-            </a:endParaRPr>
-          </a:p>
-          <a:p>
-            <a:pPr lvl="1">
-              <a:buSzPct val="75000"/>
-            </a:pPr>
-            <a:r>
-              <a:rPr lang="en-ZA" sz="3200" dirty="0" smtClean="0">
-                <a:solidFill>
-                  <a:schemeClr val="bg1">
-                    <a:lumMod val="75000"/>
-                    <a:lumOff val="25000"/>
-                  </a:schemeClr>
-                </a:solidFill>
-                <a:latin typeface="Arial Unicode MS" pitchFamily="34" charset="-128"/>
-                <a:ea typeface="Arial Unicode MS" pitchFamily="34" charset="-128"/>
-                <a:cs typeface="Arial Unicode MS" pitchFamily="34" charset="-128"/>
-              </a:rPr>
-              <a:t>- </a:t>
-            </a:r>
-            <a:r>
-              <a:rPr lang="en-ZA" sz="3200" dirty="0" err="1" smtClean="0">
-                <a:solidFill>
-                  <a:schemeClr val="bg1">
-                    <a:lumMod val="75000"/>
-                    <a:lumOff val="25000"/>
-                  </a:schemeClr>
-                </a:solidFill>
-                <a:latin typeface="Arial Unicode MS" pitchFamily="34" charset="-128"/>
-                <a:ea typeface="Arial Unicode MS" pitchFamily="34" charset="-128"/>
-                <a:cs typeface="Arial Unicode MS" pitchFamily="34" charset="-128"/>
-              </a:rPr>
-              <a:t>ManageMenu</a:t>
-            </a:r>
-            <a:endParaRPr sz="3200" dirty="0">
-              <a:solidFill>
-                <a:schemeClr val="bg1">
-                  <a:lumMod val="75000"/>
-                  <a:lumOff val="25000"/>
-                </a:schemeClr>
-              </a:solidFill>
-              <a:latin typeface="Arial Unicode MS" pitchFamily="34" charset="-128"/>
-              <a:ea typeface="Arial Unicode MS" pitchFamily="34" charset="-128"/>
-              <a:cs typeface="Arial Unicode MS" pitchFamily="34" charset="-128"/>
-            </a:endParaRPr>
-          </a:p>
-          <a:p>
-            <a:pPr lvl="1">
-              <a:buSzPct val="75000"/>
-            </a:pPr>
-            <a:r>
-              <a:rPr lang="en-ZA" sz="3200" dirty="0" smtClean="0">
-                <a:solidFill>
-                  <a:schemeClr val="bg1">
-                    <a:lumMod val="75000"/>
-                    <a:lumOff val="25000"/>
-                  </a:schemeClr>
-                </a:solidFill>
-                <a:latin typeface="Arial Unicode MS" pitchFamily="34" charset="-128"/>
-                <a:ea typeface="Arial Unicode MS" pitchFamily="34" charset="-128"/>
-                <a:cs typeface="Arial Unicode MS" pitchFamily="34" charset="-128"/>
-              </a:rPr>
-              <a:t>- Authentication</a:t>
-            </a:r>
-            <a:endParaRPr sz="3200" dirty="0">
-              <a:solidFill>
-                <a:schemeClr val="bg1">
-                  <a:lumMod val="75000"/>
-                  <a:lumOff val="25000"/>
-                </a:schemeClr>
-              </a:solidFill>
-              <a:latin typeface="Arial Unicode MS" pitchFamily="34" charset="-128"/>
-              <a:ea typeface="Arial Unicode MS" pitchFamily="34" charset="-128"/>
-              <a:cs typeface="Arial Unicode MS" pitchFamily="34" charset="-128"/>
-            </a:endParaRPr>
-          </a:p>
-          <a:p>
-            <a:pPr lvl="1">
-              <a:buSzPct val="75000"/>
-            </a:pPr>
-            <a:r>
-              <a:rPr lang="en-ZA" sz="3200" dirty="0" smtClean="0">
-                <a:solidFill>
-                  <a:schemeClr val="bg1">
-                    <a:lumMod val="75000"/>
-                    <a:lumOff val="25000"/>
-                  </a:schemeClr>
-                </a:solidFill>
-                <a:latin typeface="Arial Unicode MS" pitchFamily="34" charset="-128"/>
-                <a:ea typeface="Arial Unicode MS" pitchFamily="34" charset="-128"/>
-                <a:cs typeface="Arial Unicode MS" pitchFamily="34" charset="-128"/>
-              </a:rPr>
-              <a:t>- Manage </a:t>
-            </a:r>
-            <a:r>
-              <a:rPr lang="en-ZA" sz="3200" dirty="0">
-                <a:solidFill>
-                  <a:schemeClr val="bg1">
-                    <a:lumMod val="75000"/>
-                    <a:lumOff val="25000"/>
-                  </a:schemeClr>
-                </a:solidFill>
-                <a:latin typeface="Arial Unicode MS" pitchFamily="34" charset="-128"/>
-                <a:ea typeface="Arial Unicode MS" pitchFamily="34" charset="-128"/>
-                <a:cs typeface="Arial Unicode MS" pitchFamily="34" charset="-128"/>
-              </a:rPr>
-              <a:t>System  </a:t>
-            </a:r>
-            <a:endParaRPr sz="3200" dirty="0">
-              <a:solidFill>
-                <a:schemeClr val="bg1">
-                  <a:lumMod val="75000"/>
-                  <a:lumOff val="25000"/>
-                </a:schemeClr>
-              </a:solidFill>
-              <a:latin typeface="Arial Unicode MS" pitchFamily="34" charset="-128"/>
-              <a:ea typeface="Arial Unicode MS" pitchFamily="34" charset="-128"/>
-              <a:cs typeface="Arial Unicode MS" pitchFamily="34" charset="-128"/>
-            </a:endParaRPr>
-          </a:p>
-        </p:txBody>
-      </p:sp>
+      </p:pic>
     </p:spTree>
   </p:cSld>
   <p:clrMapOvr>
@@ -4997,313 +4585,27 @@
   <p:timing>
     <p:tnLst>
       <p:par>
-        <p:cTn id="1" dur="indefinite" restart="never" nodeType="tmRoot"/>
-      </p:par>
-    </p:tnLst>
-  </p:timing>
-</p:sld>
-</file>
-
-<file path=ppt/slides/slide14.xml><?xml version="1.0" encoding="utf-8"?>
-<p:sld xmlns:a="http://schemas.openxmlformats.org/drawingml/2006/main" xmlns:r="http://schemas.openxmlformats.org/officeDocument/2006/relationships" xmlns:p="http://schemas.openxmlformats.org/presentationml/2006/main">
-  <p:cSld>
-    <p:spTree>
-      <p:nvGrpSpPr>
-        <p:cNvPr id="1" name=""/>
-        <p:cNvGrpSpPr/>
-        <p:nvPr/>
-      </p:nvGrpSpPr>
-      <p:grpSpPr>
-        <a:xfrm>
-          <a:off x="0" y="0"/>
-          <a:ext cx="0" cy="0"/>
-          <a:chOff x="0" y="0"/>
-          <a:chExt cx="0" cy="0"/>
-        </a:xfrm>
-      </p:grpSpPr>
-      <p:sp>
-        <p:nvSpPr>
-          <p:cNvPr id="60" name="TextShape 1"/>
-          <p:cNvSpPr txBox="1"/>
-          <p:nvPr/>
-        </p:nvSpPr>
-        <p:spPr>
-          <a:xfrm>
-            <a:off x="504000" y="301320"/>
-            <a:ext cx="9071640" cy="1262160"/>
-          </a:xfrm>
-          <a:prstGeom prst="rect">
-            <a:avLst/>
-          </a:prstGeom>
-        </p:spPr>
-        <p:txBody>
-          <a:bodyPr lIns="0" tIns="0" rIns="0" bIns="0" anchor="ctr"/>
-          <a:lstStyle/>
-          <a:p>
-            <a:pPr algn="ctr"/>
-            <a:r>
-              <a:rPr lang="en-ZA" sz="6000" dirty="0" smtClean="0">
-                <a:solidFill>
-                  <a:schemeClr val="bg1">
-                    <a:lumMod val="75000"/>
-                    <a:lumOff val="25000"/>
-                  </a:schemeClr>
-                </a:solidFill>
-                <a:latin typeface="Arial Unicode MS" pitchFamily="34" charset="-128"/>
-                <a:ea typeface="Arial Unicode MS" pitchFamily="34" charset="-128"/>
-                <a:cs typeface="Arial Unicode MS" pitchFamily="34" charset="-128"/>
-              </a:rPr>
-              <a:t>Documentation:</a:t>
-            </a:r>
-            <a:endParaRPr sz="6000" dirty="0">
-              <a:solidFill>
-                <a:schemeClr val="bg1">
-                  <a:lumMod val="75000"/>
-                  <a:lumOff val="25000"/>
-                </a:schemeClr>
-              </a:solidFill>
-              <a:latin typeface="Arial Unicode MS" pitchFamily="34" charset="-128"/>
-              <a:ea typeface="Arial Unicode MS" pitchFamily="34" charset="-128"/>
-              <a:cs typeface="Arial Unicode MS" pitchFamily="34" charset="-128"/>
-            </a:endParaRPr>
-          </a:p>
-        </p:txBody>
-      </p:sp>
-      <p:sp>
-        <p:nvSpPr>
-          <p:cNvPr id="61" name="TextShape 2"/>
-          <p:cNvSpPr txBox="1"/>
-          <p:nvPr/>
-        </p:nvSpPr>
-        <p:spPr>
-          <a:xfrm>
-            <a:off x="504000" y="1769040"/>
-            <a:ext cx="9071640" cy="4384440"/>
-          </a:xfrm>
-          <a:prstGeom prst="rect">
-            <a:avLst/>
-          </a:prstGeom>
-        </p:spPr>
-        <p:txBody>
-          <a:bodyPr lIns="0" tIns="0" rIns="0" bIns="0"/>
-          <a:lstStyle/>
-          <a:p>
-            <a:pPr>
-              <a:buSzPct val="75000"/>
-            </a:pPr>
-            <a:r>
-              <a:rPr lang="en-ZA" sz="3200" dirty="0" smtClean="0">
-                <a:solidFill>
-                  <a:schemeClr val="bg1">
-                    <a:lumMod val="75000"/>
-                    <a:lumOff val="25000"/>
-                  </a:schemeClr>
-                </a:solidFill>
-                <a:latin typeface="Arial Unicode MS" pitchFamily="34" charset="-128"/>
-                <a:ea typeface="Arial Unicode MS" pitchFamily="34" charset="-128"/>
-                <a:cs typeface="Arial Unicode MS" pitchFamily="34" charset="-128"/>
-              </a:rPr>
-              <a:t>~ Functional Specification</a:t>
-            </a:r>
-            <a:endParaRPr sz="3200" dirty="0">
-              <a:solidFill>
-                <a:schemeClr val="bg1">
-                  <a:lumMod val="75000"/>
-                  <a:lumOff val="25000"/>
-                </a:schemeClr>
-              </a:solidFill>
-              <a:latin typeface="Arial Unicode MS" pitchFamily="34" charset="-128"/>
-              <a:ea typeface="Arial Unicode MS" pitchFamily="34" charset="-128"/>
-              <a:cs typeface="Arial Unicode MS" pitchFamily="34" charset="-128"/>
-            </a:endParaRPr>
-          </a:p>
-          <a:p>
-            <a:pPr>
-              <a:buSzPct val="75000"/>
-            </a:pPr>
-            <a:r>
-              <a:rPr lang="en-ZA" sz="3200" dirty="0" smtClean="0">
-                <a:solidFill>
-                  <a:schemeClr val="bg1">
-                    <a:lumMod val="75000"/>
-                    <a:lumOff val="25000"/>
-                  </a:schemeClr>
-                </a:solidFill>
-                <a:latin typeface="Arial Unicode MS" pitchFamily="34" charset="-128"/>
-                <a:ea typeface="Arial Unicode MS" pitchFamily="34" charset="-128"/>
-                <a:cs typeface="Arial Unicode MS" pitchFamily="34" charset="-128"/>
-              </a:rPr>
-              <a:t>~ Architecture </a:t>
-            </a:r>
-            <a:r>
-              <a:rPr lang="en-ZA" sz="3200" dirty="0">
-                <a:solidFill>
-                  <a:schemeClr val="bg1">
-                    <a:lumMod val="75000"/>
-                    <a:lumOff val="25000"/>
-                  </a:schemeClr>
-                </a:solidFill>
-                <a:latin typeface="Arial Unicode MS" pitchFamily="34" charset="-128"/>
-                <a:ea typeface="Arial Unicode MS" pitchFamily="34" charset="-128"/>
-                <a:cs typeface="Arial Unicode MS" pitchFamily="34" charset="-128"/>
-              </a:rPr>
-              <a:t>Specification</a:t>
-            </a:r>
-            <a:endParaRPr sz="3200" dirty="0">
-              <a:solidFill>
-                <a:schemeClr val="bg1">
-                  <a:lumMod val="75000"/>
-                  <a:lumOff val="25000"/>
-                </a:schemeClr>
-              </a:solidFill>
-              <a:latin typeface="Arial Unicode MS" pitchFamily="34" charset="-128"/>
-              <a:ea typeface="Arial Unicode MS" pitchFamily="34" charset="-128"/>
-              <a:cs typeface="Arial Unicode MS" pitchFamily="34" charset="-128"/>
-            </a:endParaRPr>
-          </a:p>
-          <a:p>
-            <a:pPr>
-              <a:buSzPct val="75000"/>
-            </a:pPr>
-            <a:r>
-              <a:rPr lang="en-ZA" sz="3200" dirty="0" smtClean="0">
-                <a:solidFill>
-                  <a:schemeClr val="bg1">
-                    <a:lumMod val="75000"/>
-                    <a:lumOff val="25000"/>
-                  </a:schemeClr>
-                </a:solidFill>
-                <a:latin typeface="Arial Unicode MS" pitchFamily="34" charset="-128"/>
-                <a:ea typeface="Arial Unicode MS" pitchFamily="34" charset="-128"/>
-                <a:cs typeface="Arial Unicode MS" pitchFamily="34" charset="-128"/>
-              </a:rPr>
-              <a:t>~ Testing </a:t>
-            </a:r>
-            <a:r>
-              <a:rPr lang="en-ZA" sz="3200" dirty="0">
-                <a:solidFill>
-                  <a:schemeClr val="bg1">
-                    <a:lumMod val="75000"/>
-                    <a:lumOff val="25000"/>
-                  </a:schemeClr>
-                </a:solidFill>
-                <a:latin typeface="Arial Unicode MS" pitchFamily="34" charset="-128"/>
-                <a:ea typeface="Arial Unicode MS" pitchFamily="34" charset="-128"/>
-                <a:cs typeface="Arial Unicode MS" pitchFamily="34" charset="-128"/>
-              </a:rPr>
-              <a:t>documentation</a:t>
-            </a:r>
-            <a:endParaRPr sz="3200" dirty="0">
-              <a:solidFill>
-                <a:schemeClr val="bg1">
-                  <a:lumMod val="75000"/>
-                  <a:lumOff val="25000"/>
-                </a:schemeClr>
-              </a:solidFill>
-              <a:latin typeface="Arial Unicode MS" pitchFamily="34" charset="-128"/>
-              <a:ea typeface="Arial Unicode MS" pitchFamily="34" charset="-128"/>
-              <a:cs typeface="Arial Unicode MS" pitchFamily="34" charset="-128"/>
-            </a:endParaRPr>
-          </a:p>
-          <a:p>
-            <a:pPr>
-              <a:buSzPct val="75000"/>
-            </a:pPr>
-            <a:r>
-              <a:rPr lang="en-ZA" sz="3200" dirty="0" smtClean="0">
-                <a:solidFill>
-                  <a:schemeClr val="bg1">
-                    <a:lumMod val="75000"/>
-                    <a:lumOff val="25000"/>
-                  </a:schemeClr>
-                </a:solidFill>
-                <a:latin typeface="Arial Unicode MS" pitchFamily="34" charset="-128"/>
-                <a:ea typeface="Arial Unicode MS" pitchFamily="34" charset="-128"/>
-                <a:cs typeface="Arial Unicode MS" pitchFamily="34" charset="-128"/>
-              </a:rPr>
-              <a:t>~ User </a:t>
-            </a:r>
-            <a:r>
-              <a:rPr lang="en-ZA" sz="3200" dirty="0">
-                <a:solidFill>
-                  <a:schemeClr val="bg1">
-                    <a:lumMod val="75000"/>
-                    <a:lumOff val="25000"/>
-                  </a:schemeClr>
-                </a:solidFill>
-                <a:latin typeface="Arial Unicode MS" pitchFamily="34" charset="-128"/>
-                <a:ea typeface="Arial Unicode MS" pitchFamily="34" charset="-128"/>
-                <a:cs typeface="Arial Unicode MS" pitchFamily="34" charset="-128"/>
-              </a:rPr>
-              <a:t>Manual</a:t>
-            </a:r>
-            <a:endParaRPr sz="3200" dirty="0">
-              <a:solidFill>
-                <a:schemeClr val="bg1">
-                  <a:lumMod val="75000"/>
-                  <a:lumOff val="25000"/>
-                </a:schemeClr>
-              </a:solidFill>
-              <a:latin typeface="Arial Unicode MS" pitchFamily="34" charset="-128"/>
-              <a:ea typeface="Arial Unicode MS" pitchFamily="34" charset="-128"/>
-              <a:cs typeface="Arial Unicode MS" pitchFamily="34" charset="-128"/>
-            </a:endParaRPr>
-          </a:p>
-          <a:p>
-            <a:pPr>
-              <a:buSzPct val="75000"/>
-            </a:pPr>
-            <a:r>
-              <a:rPr lang="en-ZA" sz="3200" dirty="0" smtClean="0">
-                <a:solidFill>
-                  <a:schemeClr val="bg1">
-                    <a:lumMod val="75000"/>
-                    <a:lumOff val="25000"/>
-                  </a:schemeClr>
-                </a:solidFill>
-                <a:latin typeface="Arial Unicode MS" pitchFamily="34" charset="-128"/>
-                <a:ea typeface="Arial Unicode MS" pitchFamily="34" charset="-128"/>
-                <a:cs typeface="Arial Unicode MS" pitchFamily="34" charset="-128"/>
-              </a:rPr>
-              <a:t>~ Design </a:t>
-            </a:r>
-            <a:r>
-              <a:rPr lang="en-ZA" sz="3200" dirty="0">
-                <a:solidFill>
-                  <a:schemeClr val="bg1">
-                    <a:lumMod val="75000"/>
-                    <a:lumOff val="25000"/>
-                  </a:schemeClr>
-                </a:solidFill>
-                <a:latin typeface="Arial Unicode MS" pitchFamily="34" charset="-128"/>
-                <a:ea typeface="Arial Unicode MS" pitchFamily="34" charset="-128"/>
-                <a:cs typeface="Arial Unicode MS" pitchFamily="34" charset="-128"/>
-              </a:rPr>
-              <a:t>Documentation</a:t>
-            </a:r>
-            <a:endParaRPr sz="3200" dirty="0">
-              <a:solidFill>
-                <a:schemeClr val="bg1">
-                  <a:lumMod val="75000"/>
-                  <a:lumOff val="25000"/>
-                </a:schemeClr>
-              </a:solidFill>
-              <a:latin typeface="Arial Unicode MS" pitchFamily="34" charset="-128"/>
-              <a:ea typeface="Arial Unicode MS" pitchFamily="34" charset="-128"/>
-              <a:cs typeface="Arial Unicode MS" pitchFamily="34" charset="-128"/>
-            </a:endParaRPr>
-          </a:p>
-        </p:txBody>
-      </p:sp>
-    </p:spTree>
-  </p:cSld>
-  <p:clrMapOvr>
-    <a:masterClrMapping/>
-  </p:clrMapOvr>
-  <p:timing>
-    <p:tnLst>
-      <p:par>
-        <p:cTn id="1" dur="indefinite" restart="never" nodeType="tmRoot"/>
+        <p:cTn id="1" dur="indefinite" restart="never" nodeType="tmRoot">
+          <p:childTnLst>
+            <p:seq>
+              <p:cTn id="2" nodeType="mainSeq"/>
+              <p:prevCondLst>
+                <p:cond evt="onPrev" delay="0">
+                  <p:tgtEl>
+                    <p:sldTgt/>
+                  </p:tgtEl>
+                </p:cond>
+              </p:prevCondLst>
+              <p:nextCondLst>
+                <p:cond evt="onNext" delay="0">
+                  <p:tgtEl>
+                    <p:sldTgt/>
+                  </p:tgtEl>
+                </p:cond>
+              </p:nextCondLst>
+            </p:seq>
+          </p:childTnLst>
+        </p:cTn>
       </p:par>
     </p:tnLst>
   </p:timing>
@@ -5380,7 +4682,7 @@
         <p:spPr>
           <a:xfrm>
             <a:off x="719832" y="1468030"/>
-            <a:ext cx="7945272" cy="3354765"/>
+            <a:ext cx="7945272" cy="3908762"/>
           </a:xfrm>
           <a:prstGeom prst="rect">
             <a:avLst/>
@@ -5456,6 +4758,35 @@
               </a:rPr>
               <a:t>~ Unit Testing </a:t>
             </a:r>
+            <a:endParaRPr lang="en-US" sz="3600" dirty="0" smtClean="0">
+              <a:solidFill>
+                <a:srgbClr val="4D4D4D"/>
+              </a:solidFill>
+              <a:latin typeface="Arial Unicode MS" pitchFamily="34" charset="-128"/>
+              <a:ea typeface="Arial Unicode MS" pitchFamily="34" charset="-128"/>
+              <a:cs typeface="Arial Unicode MS" pitchFamily="34" charset="-128"/>
+            </a:endParaRPr>
+          </a:p>
+          <a:p>
+            <a:r>
+              <a:rPr lang="en-US" sz="3600" dirty="0" smtClean="0">
+                <a:solidFill>
+                  <a:srgbClr val="4D4D4D"/>
+                </a:solidFill>
+                <a:latin typeface="Arial Unicode MS" pitchFamily="34" charset="-128"/>
+                <a:ea typeface="Arial Unicode MS" pitchFamily="34" charset="-128"/>
+                <a:cs typeface="Arial Unicode MS" pitchFamily="34" charset="-128"/>
+              </a:rPr>
+              <a:t>~ Demo of CMS </a:t>
+            </a:r>
+            <a:endParaRPr lang="en-US" sz="3600" dirty="0" smtClean="0">
+              <a:solidFill>
+                <a:srgbClr val="4D4D4D"/>
+              </a:solidFill>
+              <a:latin typeface="Arial Unicode MS" pitchFamily="34" charset="-128"/>
+              <a:ea typeface="Arial Unicode MS" pitchFamily="34" charset="-128"/>
+              <a:cs typeface="Arial Unicode MS" pitchFamily="34" charset="-128"/>
+            </a:endParaRPr>
           </a:p>
           <a:p>
             <a:endParaRPr lang="en-US" sz="3200" dirty="0" smtClean="0">
@@ -6162,8 +5493,38 @@
                 <a:ea typeface="Arial Unicode MS" pitchFamily="34" charset="-128"/>
                 <a:cs typeface="Arial Unicode MS" pitchFamily="34" charset="-128"/>
               </a:rPr>
-              <a:t>2) Implement planning</a:t>
-            </a:r>
+              <a:t>2</a:t>
+            </a:r>
+            <a:r>
+              <a:rPr lang="en-US" sz="3600" smtClean="0">
+                <a:solidFill>
+                  <a:srgbClr val="4D4D4D"/>
+                </a:solidFill>
+                <a:latin typeface="Arial Unicode MS" pitchFamily="34" charset="-128"/>
+                <a:ea typeface="Arial Unicode MS" pitchFamily="34" charset="-128"/>
+                <a:cs typeface="Arial Unicode MS" pitchFamily="34" charset="-128"/>
+              </a:rPr>
+              <a:t>) </a:t>
+            </a:r>
+            <a:r>
+              <a:rPr lang="en-US" sz="3600" smtClean="0">
+                <a:solidFill>
+                  <a:srgbClr val="4D4D4D"/>
+                </a:solidFill>
+                <a:latin typeface="Arial Unicode MS" pitchFamily="34" charset="-128"/>
+                <a:ea typeface="Arial Unicode MS" pitchFamily="34" charset="-128"/>
+                <a:cs typeface="Arial Unicode MS" pitchFamily="34" charset="-128"/>
+              </a:rPr>
+              <a:t>Implementation </a:t>
+            </a:r>
+            <a:endParaRPr lang="en-US" sz="3600" dirty="0" smtClean="0">
+              <a:solidFill>
+                <a:srgbClr val="4D4D4D"/>
+              </a:solidFill>
+              <a:latin typeface="Arial Unicode MS" pitchFamily="34" charset="-128"/>
+              <a:ea typeface="Arial Unicode MS" pitchFamily="34" charset="-128"/>
+              <a:cs typeface="Arial Unicode MS" pitchFamily="34" charset="-128"/>
+            </a:endParaRPr>
           </a:p>
           <a:p>
             <a:r>
@@ -6186,8 +5547,27 @@
                 <a:ea typeface="Arial Unicode MS" pitchFamily="34" charset="-128"/>
                 <a:cs typeface="Arial Unicode MS" pitchFamily="34" charset="-128"/>
               </a:rPr>
-              <a:t>3) Test planning</a:t>
-            </a:r>
+              <a:t>3) </a:t>
+            </a:r>
+            <a:r>
+              <a:rPr lang="en-US" sz="3600" dirty="0" smtClean="0">
+                <a:solidFill>
+                  <a:srgbClr val="4D4D4D"/>
+                </a:solidFill>
+                <a:latin typeface="Arial Unicode MS" pitchFamily="34" charset="-128"/>
+                <a:ea typeface="Arial Unicode MS" pitchFamily="34" charset="-128"/>
+                <a:cs typeface="Arial Unicode MS" pitchFamily="34" charset="-128"/>
+              </a:rPr>
+              <a:t>Tests</a:t>
+            </a:r>
+            <a:endParaRPr lang="en-US" sz="3600" dirty="0" smtClean="0">
+              <a:solidFill>
+                <a:srgbClr val="4D4D4D"/>
+              </a:solidFill>
+              <a:latin typeface="Arial Unicode MS" pitchFamily="34" charset="-128"/>
+              <a:ea typeface="Arial Unicode MS" pitchFamily="34" charset="-128"/>
+              <a:cs typeface="Arial Unicode MS" pitchFamily="34" charset="-128"/>
+            </a:endParaRPr>
           </a:p>
           <a:p>
             <a:r>
@@ -6409,7 +5789,7 @@
         </p:nvSpPr>
         <p:spPr>
           <a:xfrm>
-            <a:off x="1055480" y="251445"/>
+            <a:off x="1055480" y="107429"/>
             <a:ext cx="7945272" cy="1015663"/>
           </a:xfrm>
           <a:prstGeom prst="rect">
@@ -6453,8 +5833,8 @@
         </p:nvSpPr>
         <p:spPr>
           <a:xfrm>
-            <a:off x="287784" y="1403573"/>
-            <a:ext cx="9432801" cy="4524315"/>
+            <a:off x="287784" y="899517"/>
+            <a:ext cx="9432801" cy="7232749"/>
           </a:xfrm>
           <a:prstGeom prst="rect">
             <a:avLst/>
@@ -6476,12 +5856,23 @@
                 <a:ea typeface="Arial Unicode MS" pitchFamily="34" charset="-128"/>
                 <a:cs typeface="Arial Unicode MS" pitchFamily="34" charset="-128"/>
               </a:rPr>
-              <a:t>~ Present Progress and demo functionality</a:t>
-            </a:r>
-          </a:p>
-          <a:p>
-            <a:r>
-              <a:rPr lang="en-US" sz="3600" dirty="0" smtClean="0">
+              <a:t>~ </a:t>
+            </a:r>
+            <a:r>
+              <a:rPr lang="en-US" sz="3200" dirty="0" smtClean="0">
+                <a:solidFill>
+                  <a:srgbClr val="4D4D4D"/>
+                </a:solidFill>
+                <a:latin typeface="Arial Unicode MS" pitchFamily="34" charset="-128"/>
+                <a:ea typeface="Arial Unicode MS" pitchFamily="34" charset="-128"/>
+                <a:cs typeface="Arial Unicode MS" pitchFamily="34" charset="-128"/>
+              </a:rPr>
+              <a:t>Present Progress and demo functionality</a:t>
+            </a:r>
+          </a:p>
+          <a:p>
+            <a:r>
+              <a:rPr lang="en-US" sz="3200" dirty="0" smtClean="0">
                 <a:solidFill>
                   <a:srgbClr val="4D4D4D"/>
                 </a:solidFill>
@@ -6494,7 +5885,7 @@
           </a:p>
           <a:p>
             <a:r>
-              <a:rPr lang="en-US" sz="3600" dirty="0" smtClean="0">
+              <a:rPr lang="en-US" sz="3200" dirty="0" smtClean="0">
                 <a:solidFill>
                   <a:srgbClr val="4D4D4D"/>
                 </a:solidFill>
@@ -6507,19 +5898,30 @@
           </a:p>
           <a:p>
             <a:r>
-              <a:rPr lang="en-US" sz="3600" dirty="0" smtClean="0">
-                <a:solidFill>
-                  <a:srgbClr val="4D4D4D"/>
-                </a:solidFill>
-                <a:latin typeface="Arial Unicode MS" pitchFamily="34" charset="-128"/>
-                <a:ea typeface="Arial Unicode MS" pitchFamily="34" charset="-128"/>
-                <a:cs typeface="Arial Unicode MS" pitchFamily="34" charset="-128"/>
-              </a:rPr>
-              <a:t>~ Create necessary issues for alterations</a:t>
-            </a:r>
-          </a:p>
-          <a:p>
-            <a:endParaRPr lang="en-US" sz="3600" dirty="0">
+              <a:rPr lang="en-US" sz="3200" dirty="0" smtClean="0">
+                <a:solidFill>
+                  <a:srgbClr val="4D4D4D"/>
+                </a:solidFill>
+                <a:latin typeface="Arial Unicode MS" pitchFamily="34" charset="-128"/>
+                <a:ea typeface="Arial Unicode MS" pitchFamily="34" charset="-128"/>
+                <a:cs typeface="Arial Unicode MS" pitchFamily="34" charset="-128"/>
+              </a:rPr>
+              <a:t>~ Create necessary issues for </a:t>
+            </a:r>
+            <a:r>
+              <a:rPr lang="en-US" sz="3200" dirty="0" smtClean="0">
+                <a:solidFill>
+                  <a:srgbClr val="4D4D4D"/>
+                </a:solidFill>
+                <a:latin typeface="Arial Unicode MS" pitchFamily="34" charset="-128"/>
+                <a:ea typeface="Arial Unicode MS" pitchFamily="34" charset="-128"/>
+                <a:cs typeface="Arial Unicode MS" pitchFamily="34" charset="-128"/>
+              </a:rPr>
+              <a:t>alterations</a:t>
+            </a:r>
+          </a:p>
+          <a:p>
+            <a:endParaRPr lang="en-US" sz="3200" dirty="0" smtClean="0">
               <a:solidFill>
                 <a:srgbClr val="4D4D4D"/>
               </a:solidFill>
@@ -6538,8 +5940,196 @@
                 <a:ea typeface="Arial Unicode MS" pitchFamily="34" charset="-128"/>
                 <a:cs typeface="Arial Unicode MS" pitchFamily="34" charset="-128"/>
               </a:rPr>
-              <a:t>Meeting Dates:</a:t>
-            </a:r>
+              <a:t>Meeting </a:t>
+            </a:r>
+            <a:r>
+              <a:rPr lang="en-US" sz="3600" b="1" dirty="0" smtClean="0">
+                <a:solidFill>
+                  <a:srgbClr val="4D4D4D"/>
+                </a:solidFill>
+                <a:latin typeface="Arial Unicode MS" pitchFamily="34" charset="-128"/>
+                <a:ea typeface="Arial Unicode MS" pitchFamily="34" charset="-128"/>
+                <a:cs typeface="Arial Unicode MS" pitchFamily="34" charset="-128"/>
+              </a:rPr>
+              <a:t>Dates</a:t>
+            </a:r>
+            <a:r>
+              <a:rPr lang="en-US" sz="3600" b="1" dirty="0" smtClean="0">
+                <a:solidFill>
+                  <a:srgbClr val="4D4D4D"/>
+                </a:solidFill>
+                <a:latin typeface="Arial Unicode MS" pitchFamily="34" charset="-128"/>
+                <a:ea typeface="Arial Unicode MS" pitchFamily="34" charset="-128"/>
+                <a:cs typeface="Arial Unicode MS" pitchFamily="34" charset="-128"/>
+              </a:rPr>
+              <a:t>:</a:t>
+            </a:r>
+          </a:p>
+          <a:p>
+            <a:pPr marL="742950" indent="-742950"/>
+            <a:r>
+              <a:rPr lang="en-US" sz="3200" dirty="0" smtClean="0">
+                <a:solidFill>
+                  <a:srgbClr val="4D4D4D"/>
+                </a:solidFill>
+                <a:latin typeface="Arial Unicode MS" pitchFamily="34" charset="-128"/>
+                <a:ea typeface="Arial Unicode MS" pitchFamily="34" charset="-128"/>
+                <a:cs typeface="Arial Unicode MS" pitchFamily="34" charset="-128"/>
+              </a:rPr>
+              <a:t>1)  15 May 2015 </a:t>
+            </a:r>
+          </a:p>
+          <a:p>
+            <a:pPr marL="1200150" lvl="1" indent="-742950"/>
+            <a:r>
+              <a:rPr lang="en-US" sz="3200" dirty="0" smtClean="0">
+                <a:solidFill>
+                  <a:srgbClr val="4D4D4D"/>
+                </a:solidFill>
+                <a:latin typeface="Arial Unicode MS" pitchFamily="34" charset="-128"/>
+                <a:ea typeface="Arial Unicode MS" pitchFamily="34" charset="-128"/>
+                <a:cs typeface="Arial Unicode MS" pitchFamily="34" charset="-128"/>
+              </a:rPr>
+              <a:t>   </a:t>
+            </a:r>
+            <a:r>
+              <a:rPr lang="en-US" sz="2800" dirty="0" smtClean="0">
+                <a:solidFill>
+                  <a:srgbClr val="4D4D4D"/>
+                </a:solidFill>
+                <a:latin typeface="Arial Unicode MS" pitchFamily="34" charset="-128"/>
+                <a:ea typeface="Arial Unicode MS" pitchFamily="34" charset="-128"/>
+                <a:cs typeface="Arial Unicode MS" pitchFamily="34" charset="-128"/>
+              </a:rPr>
+              <a:t>~ Discussed what they expected us to deliver </a:t>
+            </a:r>
+            <a:endParaRPr lang="en-US" sz="3200" dirty="0" smtClean="0">
+              <a:solidFill>
+                <a:srgbClr val="4D4D4D"/>
+              </a:solidFill>
+              <a:latin typeface="Arial Unicode MS" pitchFamily="34" charset="-128"/>
+              <a:ea typeface="Arial Unicode MS" pitchFamily="34" charset="-128"/>
+              <a:cs typeface="Arial Unicode MS" pitchFamily="34" charset="-128"/>
+            </a:endParaRPr>
+          </a:p>
+          <a:p>
+            <a:pPr marL="514350" indent="-514350"/>
+            <a:r>
+              <a:rPr lang="en-US" sz="3200" dirty="0" smtClean="0">
+                <a:solidFill>
+                  <a:srgbClr val="4D4D4D"/>
+                </a:solidFill>
+                <a:latin typeface="Arial Unicode MS" pitchFamily="34" charset="-128"/>
+                <a:ea typeface="Arial Unicode MS" pitchFamily="34" charset="-128"/>
+                <a:cs typeface="Arial Unicode MS" pitchFamily="34" charset="-128"/>
+              </a:rPr>
+              <a:t>2)   </a:t>
+            </a:r>
+            <a:r>
+              <a:rPr lang="en-US" sz="3200" dirty="0" smtClean="0">
+                <a:solidFill>
+                  <a:srgbClr val="4D4D4D"/>
+                </a:solidFill>
+                <a:latin typeface="Arial Unicode MS" pitchFamily="34" charset="-128"/>
+                <a:ea typeface="Arial Unicode MS" pitchFamily="34" charset="-128"/>
+                <a:cs typeface="Arial Unicode MS" pitchFamily="34" charset="-128"/>
+              </a:rPr>
+              <a:t>7 July 2015</a:t>
+            </a:r>
+          </a:p>
+          <a:p>
+            <a:pPr marL="971550" lvl="1" indent="-514350"/>
+            <a:r>
+              <a:rPr lang="en-US" sz="3200" dirty="0" smtClean="0">
+                <a:solidFill>
+                  <a:srgbClr val="4D4D4D"/>
+                </a:solidFill>
+                <a:latin typeface="Arial Unicode MS" pitchFamily="34" charset="-128"/>
+                <a:ea typeface="Arial Unicode MS" pitchFamily="34" charset="-128"/>
+                <a:cs typeface="Arial Unicode MS" pitchFamily="34" charset="-128"/>
+              </a:rPr>
+              <a:t> </a:t>
+            </a:r>
+            <a:r>
+              <a:rPr lang="en-US" sz="3200" dirty="0" smtClean="0">
+                <a:solidFill>
+                  <a:srgbClr val="4D4D4D"/>
+                </a:solidFill>
+                <a:latin typeface="Arial Unicode MS" pitchFamily="34" charset="-128"/>
+                <a:ea typeface="Arial Unicode MS" pitchFamily="34" charset="-128"/>
+                <a:cs typeface="Arial Unicode MS" pitchFamily="34" charset="-128"/>
+              </a:rPr>
+              <a:t>  </a:t>
+            </a:r>
+            <a:r>
+              <a:rPr lang="en-US" sz="2800" dirty="0" smtClean="0">
+                <a:solidFill>
+                  <a:srgbClr val="4D4D4D"/>
+                </a:solidFill>
+                <a:latin typeface="Arial Unicode MS" pitchFamily="34" charset="-128"/>
+                <a:ea typeface="Arial Unicode MS" pitchFamily="34" charset="-128"/>
+                <a:cs typeface="Arial Unicode MS" pitchFamily="34" charset="-128"/>
+              </a:rPr>
+              <a:t>~ Demo of first phase completion</a:t>
+            </a:r>
+            <a:r>
+              <a:rPr lang="en-US" sz="3200" dirty="0" smtClean="0">
+                <a:solidFill>
+                  <a:srgbClr val="4D4D4D"/>
+                </a:solidFill>
+                <a:latin typeface="Arial Unicode MS" pitchFamily="34" charset="-128"/>
+                <a:ea typeface="Arial Unicode MS" pitchFamily="34" charset="-128"/>
+                <a:cs typeface="Arial Unicode MS" pitchFamily="34" charset="-128"/>
+              </a:rPr>
+              <a:t> </a:t>
+            </a:r>
+          </a:p>
+          <a:p>
+            <a:pPr marL="514350" indent="-514350"/>
+            <a:r>
+              <a:rPr lang="en-US" sz="3200" dirty="0" smtClean="0">
+                <a:solidFill>
+                  <a:srgbClr val="4D4D4D"/>
+                </a:solidFill>
+                <a:latin typeface="Arial Unicode MS" pitchFamily="34" charset="-128"/>
+                <a:ea typeface="Arial Unicode MS" pitchFamily="34" charset="-128"/>
+                <a:cs typeface="Arial Unicode MS" pitchFamily="34" charset="-128"/>
+              </a:rPr>
+              <a:t>3)  22 July </a:t>
+            </a:r>
+          </a:p>
+          <a:p>
+            <a:pPr marL="514350" indent="-514350"/>
+            <a:r>
+              <a:rPr lang="en-US" sz="3200" dirty="0" smtClean="0">
+                <a:solidFill>
+                  <a:srgbClr val="4D4D4D"/>
+                </a:solidFill>
+                <a:latin typeface="Arial Unicode MS" pitchFamily="34" charset="-128"/>
+                <a:ea typeface="Arial Unicode MS" pitchFamily="34" charset="-128"/>
+                <a:cs typeface="Arial Unicode MS" pitchFamily="34" charset="-128"/>
+              </a:rPr>
+              <a:t>	  </a:t>
+            </a:r>
+            <a:r>
+              <a:rPr lang="en-US" sz="2800" dirty="0" smtClean="0">
+                <a:solidFill>
+                  <a:srgbClr val="4D4D4D"/>
+                </a:solidFill>
+                <a:latin typeface="Arial Unicode MS" pitchFamily="34" charset="-128"/>
+                <a:ea typeface="Arial Unicode MS" pitchFamily="34" charset="-128"/>
+                <a:cs typeface="Arial Unicode MS" pitchFamily="34" charset="-128"/>
+              </a:rPr>
+              <a:t>~ Demo of second phase completion</a:t>
+            </a:r>
+            <a:endParaRPr lang="en-US" sz="2800" dirty="0" smtClean="0">
+              <a:solidFill>
+                <a:srgbClr val="4D4D4D"/>
+              </a:solidFill>
+              <a:latin typeface="Arial Unicode MS" pitchFamily="34" charset="-128"/>
+              <a:ea typeface="Arial Unicode MS" pitchFamily="34" charset="-128"/>
+              <a:cs typeface="Arial Unicode MS" pitchFamily="34" charset="-128"/>
+            </a:endParaRPr>
           </a:p>
           <a:p>
             <a:endParaRPr lang="en-US" sz="3600" b="1" dirty="0" smtClean="0">
@@ -6701,29 +6291,7 @@
                 <a:ea typeface="Arial Unicode MS" pitchFamily="34" charset="-128"/>
                 <a:cs typeface="Arial Unicode MS" pitchFamily="34" charset="-128"/>
               </a:rPr>
-              <a:t>~ Waffle.io – Scrum Board, </a:t>
-            </a:r>
-            <a:r>
-              <a:rPr lang="en-US" sz="3600" dirty="0" smtClean="0">
-                <a:solidFill>
-                  <a:srgbClr val="4D4D4D"/>
-                </a:solidFill>
-                <a:latin typeface="Arial Unicode MS" pitchFamily="34" charset="-128"/>
-                <a:ea typeface="Arial Unicode MS" pitchFamily="34" charset="-128"/>
-                <a:cs typeface="Arial Unicode MS" pitchFamily="34" charset="-128"/>
-              </a:rPr>
-              <a:t>linked </a:t>
-            </a:r>
-            <a:r>
-              <a:rPr lang="en-US" sz="3600" dirty="0" smtClean="0">
-                <a:solidFill>
-                  <a:srgbClr val="4D4D4D"/>
-                </a:solidFill>
-                <a:latin typeface="Arial Unicode MS" pitchFamily="34" charset="-128"/>
-                <a:ea typeface="Arial Unicode MS" pitchFamily="34" charset="-128"/>
-                <a:cs typeface="Arial Unicode MS" pitchFamily="34" charset="-128"/>
-              </a:rPr>
-              <a:t>with all </a:t>
+              <a:t>~ Waffle.io – Scrum Board, linked with all </a:t>
             </a:r>
             <a:r>
               <a:rPr lang="en-US" sz="3600" dirty="0" err="1" smtClean="0">

</xml_diff>